<commit_message>
finished paper & poster
</commit_message>
<xml_diff>
--- a/Verslagen/poster_BP_INF_Gielkens_V2.pptx
+++ b/Verslagen/poster_BP_INF_Gielkens_V2.pptx
@@ -221,7 +221,7 @@
           <a:p>
             <a:fld id="{A5A46936-730D-204E-AB52-3BEB64B90A85}" type="datetimeFigureOut">
               <a:rPr lang="nl-NL" smtClean="0"/>
-              <a:t>15-5-2025</a:t>
+              <a:t>18-5-2025</a:t>
             </a:fld>
             <a:endParaRPr lang="nl-NL"/>
           </a:p>
@@ -386,7 +386,7 @@
           <a:p>
             <a:fld id="{97349249-6D1C-0748-B1D9-2AF3A057365D}" type="datetimeFigureOut">
               <a:rPr lang="nl-NL" smtClean="0"/>
-              <a:t>15-5-2025</a:t>
+              <a:t>18-5-2025</a:t>
             </a:fld>
             <a:endParaRPr lang="nl-NL"/>
           </a:p>
@@ -1576,7 +1576,7 @@
           <a:p>
             <a:fld id="{A72B7129-FE34-674B-A2EC-97FC337DE4A7}" type="datetimeFigureOut">
               <a:rPr lang="nl-NL" smtClean="0"/>
-              <a:t>15-5-2025</a:t>
+              <a:t>18-5-2025</a:t>
             </a:fld>
             <a:endParaRPr lang="nl-NL"/>
           </a:p>
@@ -1974,7 +1974,7 @@
         </p:nvCxnSpPr>
         <p:spPr>
           <a:xfrm>
-            <a:off x="10514283" y="21863813"/>
+            <a:off x="10514283" y="21834938"/>
             <a:ext cx="0" cy="120285"/>
           </a:xfrm>
           <a:prstGeom prst="line">
@@ -2018,8 +2018,8 @@
         </p:nvCxnSpPr>
         <p:spPr>
           <a:xfrm>
-            <a:off x="10526007" y="24743612"/>
-            <a:ext cx="0" cy="129910"/>
+            <a:off x="10526007" y="25357206"/>
+            <a:ext cx="0" cy="74581"/>
           </a:xfrm>
           <a:prstGeom prst="line">
             <a:avLst/>
@@ -2261,7 +2261,73 @@
                 <a:ea typeface="Aptos" panose="020B0004020202020204" pitchFamily="34" charset="0"/>
                 <a:cs typeface="Times New Roman" panose="02020603050405020304" pitchFamily="18" charset="0"/>
               </a:rPr>
-              <a:t>In the modern workplace, employee well-being is becoming ever more acknowledged as a central element in both job satisfaction and productivity. Although commercial products such as smartwatches exist for health monitoring, such solutions tend to be costly, not broadly available, or closed systems with minimal transparency.</a:t>
+              <a:t>In the modern workplace, employee well-being is becoming ever more acknowledged as a central element in both job satisfaction and productivity [1]. While </a:t>
+            </a:r>
+            <a:r>
+              <a:rPr lang="en-US" sz="1800" b="1" kern="100" dirty="0">
+                <a:solidFill>
+                  <a:srgbClr val="FF0000"/>
+                </a:solidFill>
+                <a:latin typeface="Aptos" panose="020B0004020202020204" pitchFamily="34" charset="0"/>
+                <a:ea typeface="Aptos" panose="020B0004020202020204" pitchFamily="34" charset="0"/>
+                <a:cs typeface="Times New Roman" panose="02020603050405020304" pitchFamily="18" charset="0"/>
+              </a:rPr>
+              <a:t>commercial products </a:t>
+            </a:r>
+            <a:r>
+              <a:rPr lang="en-US" sz="1800" kern="100" dirty="0">
+                <a:solidFill>
+                  <a:schemeClr val="tx1"/>
+                </a:solidFill>
+                <a:latin typeface="Aptos" panose="020B0004020202020204" pitchFamily="34" charset="0"/>
+                <a:ea typeface="Aptos" panose="020B0004020202020204" pitchFamily="34" charset="0"/>
+                <a:cs typeface="Times New Roman" panose="02020603050405020304" pitchFamily="18" charset="0"/>
+              </a:rPr>
+              <a:t>like smartwatches offer health monitoring, they often </a:t>
+            </a:r>
+            <a:r>
+              <a:rPr lang="en-US" sz="1800" b="1" kern="100" dirty="0">
+                <a:solidFill>
+                  <a:srgbClr val="FF0000"/>
+                </a:solidFill>
+                <a:latin typeface="Aptos" panose="020B0004020202020204" pitchFamily="34" charset="0"/>
+                <a:ea typeface="Aptos" panose="020B0004020202020204" pitchFamily="34" charset="0"/>
+                <a:cs typeface="Times New Roman" panose="02020603050405020304" pitchFamily="18" charset="0"/>
+              </a:rPr>
+              <a:t>lack transparency </a:t>
+            </a:r>
+            <a:r>
+              <a:rPr lang="en-US" sz="1800" kern="100" dirty="0">
+                <a:solidFill>
+                  <a:schemeClr val="tx1"/>
+                </a:solidFill>
+                <a:latin typeface="Aptos" panose="020B0004020202020204" pitchFamily="34" charset="0"/>
+                <a:ea typeface="Aptos" panose="020B0004020202020204" pitchFamily="34" charset="0"/>
+                <a:cs typeface="Times New Roman" panose="02020603050405020304" pitchFamily="18" charset="0"/>
+              </a:rPr>
+              <a:t>in how measurements are taken and are typically </a:t>
+            </a:r>
+            <a:r>
+              <a:rPr lang="en-US" sz="1800" b="1" kern="100" dirty="0">
+                <a:solidFill>
+                  <a:srgbClr val="FF0000"/>
+                </a:solidFill>
+                <a:latin typeface="Aptos" panose="020B0004020202020204" pitchFamily="34" charset="0"/>
+                <a:ea typeface="Aptos" panose="020B0004020202020204" pitchFamily="34" charset="0"/>
+                <a:cs typeface="Times New Roman" panose="02020603050405020304" pitchFamily="18" charset="0"/>
+              </a:rPr>
+              <a:t>limited to wrist-based sensing</a:t>
+            </a:r>
+            <a:r>
+              <a:rPr lang="en-US" sz="1800" kern="100" dirty="0">
+                <a:solidFill>
+                  <a:schemeClr val="tx1"/>
+                </a:solidFill>
+                <a:latin typeface="Aptos" panose="020B0004020202020204" pitchFamily="34" charset="0"/>
+                <a:ea typeface="Aptos" panose="020B0004020202020204" pitchFamily="34" charset="0"/>
+                <a:cs typeface="Times New Roman" panose="02020603050405020304" pitchFamily="18" charset="0"/>
+              </a:rPr>
+              <a:t>, which has its limitations for parameters like galvanic skin response (GSR) and respiration. </a:t>
             </a:r>
           </a:p>
           <a:p>
@@ -2359,7 +2425,7 @@
                 <a:ea typeface="Aptos" panose="020B0004020202020204" pitchFamily="34" charset="0"/>
                 <a:cs typeface="Times New Roman" panose="02020603050405020304" pitchFamily="18" charset="0"/>
               </a:rPr>
-              <a:t>heart rate, skin conductance (GSR), and respiration rate</a:t>
+              <a:t>heart rate, GSR, and respiration rate</a:t>
             </a:r>
             <a:r>
               <a:rPr lang="en-US" sz="1800" kern="100" dirty="0">
@@ -2490,7 +2556,7 @@
           <a:p>
             <a:r>
               <a:rPr lang="en-US" dirty="0"/>
-              <a:t>Designing a tool for measuring welfare parameters</a:t>
+              <a:t>Designing a tool for measuring well-being parameters</a:t>
             </a:r>
             <a:endParaRPr lang="nl-BE" dirty="0"/>
           </a:p>
@@ -2784,291 +2850,6 @@
               <a:ea typeface="Aptos" panose="020B0004020202020204" pitchFamily="34" charset="0"/>
               <a:cs typeface="Times New Roman" panose="02020603050405020304" pitchFamily="18" charset="0"/>
             </a:endParaRPr>
-          </a:p>
-          <a:p>
-            <a:pPr>
-              <a:lnSpc>
-                <a:spcPct val="115000"/>
-              </a:lnSpc>
-              <a:spcAft>
-                <a:spcPts val="800"/>
-              </a:spcAft>
-            </a:pPr>
-            <a:r>
-              <a:rPr lang="nl-BE" sz="2400" b="1" kern="100" dirty="0" err="1">
-                <a:solidFill>
-                  <a:sysClr val="windowText" lastClr="000000"/>
-                </a:solidFill>
-                <a:effectLst/>
-                <a:latin typeface="Aptos" panose="020B0004020202020204" pitchFamily="34" charset="0"/>
-                <a:ea typeface="Aptos" panose="020B0004020202020204" pitchFamily="34" charset="0"/>
-                <a:cs typeface="Times New Roman" panose="02020603050405020304" pitchFamily="18" charset="0"/>
-              </a:rPr>
-              <a:t>Materials</a:t>
-            </a:r>
-            <a:endParaRPr lang="nl-BE" sz="2000" kern="100" dirty="0">
-              <a:solidFill>
-                <a:sysClr val="windowText" lastClr="000000"/>
-              </a:solidFill>
-              <a:effectLst/>
-              <a:latin typeface="Aptos" panose="020B0004020202020204" pitchFamily="34" charset="0"/>
-              <a:ea typeface="Aptos" panose="020B0004020202020204" pitchFamily="34" charset="0"/>
-              <a:cs typeface="Times New Roman" panose="02020603050405020304" pitchFamily="18" charset="0"/>
-            </a:endParaRPr>
-          </a:p>
-          <a:p>
-            <a:pPr>
-              <a:lnSpc>
-                <a:spcPct val="115000"/>
-              </a:lnSpc>
-              <a:spcAft>
-                <a:spcPts val="1200"/>
-              </a:spcAft>
-            </a:pPr>
-            <a:r>
-              <a:rPr lang="en-US" sz="2000" kern="100" dirty="0">
-                <a:solidFill>
-                  <a:sysClr val="windowText" lastClr="000000"/>
-                </a:solidFill>
-                <a:effectLst/>
-                <a:latin typeface="Aptos" panose="020B0004020202020204" pitchFamily="34" charset="0"/>
-                <a:ea typeface="Aptos" panose="020B0004020202020204" pitchFamily="34" charset="0"/>
-                <a:cs typeface="Times New Roman" panose="02020603050405020304" pitchFamily="18" charset="0"/>
-              </a:rPr>
-              <a:t>The portable stress measurement device is powered by the </a:t>
-            </a:r>
-            <a:r>
-              <a:rPr lang="en-US" sz="2000" b="1" kern="100" dirty="0">
-                <a:solidFill>
-                  <a:srgbClr val="0070C0"/>
-                </a:solidFill>
-                <a:effectLst/>
-                <a:latin typeface="Aptos" panose="020B0004020202020204" pitchFamily="34" charset="0"/>
-                <a:ea typeface="Aptos" panose="020B0004020202020204" pitchFamily="34" charset="0"/>
-                <a:cs typeface="Times New Roman" panose="02020603050405020304" pitchFamily="18" charset="0"/>
-              </a:rPr>
-              <a:t>Arduino Nano ESP32</a:t>
-            </a:r>
-            <a:r>
-              <a:rPr lang="en-US" sz="2000" kern="100" dirty="0">
-                <a:solidFill>
-                  <a:sysClr val="windowText" lastClr="000000"/>
-                </a:solidFill>
-                <a:effectLst/>
-                <a:latin typeface="Aptos" panose="020B0004020202020204" pitchFamily="34" charset="0"/>
-                <a:ea typeface="Aptos" panose="020B0004020202020204" pitchFamily="34" charset="0"/>
-                <a:cs typeface="Times New Roman" panose="02020603050405020304" pitchFamily="18" charset="0"/>
-              </a:rPr>
-              <a:t>, chosen for its compact size, low power consumption, and built-in Bluetooth, enabling real-time wireless data transmission to a smartphone. It collects data from three main sensors:</a:t>
-            </a:r>
-          </a:p>
-          <a:p>
-            <a:pPr marL="324000" indent="-342900">
-              <a:lnSpc>
-                <a:spcPct val="115000"/>
-              </a:lnSpc>
-              <a:buFont typeface="Arial" panose="020B0604020202020204" pitchFamily="34" charset="0"/>
-              <a:buChar char="•"/>
-            </a:pPr>
-            <a:r>
-              <a:rPr lang="en-US" sz="2000" b="1" kern="100" dirty="0">
-                <a:solidFill>
-                  <a:srgbClr val="0070C0"/>
-                </a:solidFill>
-                <a:effectLst/>
-                <a:latin typeface="Aptos" panose="020B0004020202020204" pitchFamily="34" charset="0"/>
-                <a:ea typeface="Aptos" panose="020B0004020202020204" pitchFamily="34" charset="0"/>
-                <a:cs typeface="Times New Roman" panose="02020603050405020304" pitchFamily="18" charset="0"/>
-              </a:rPr>
-              <a:t>MAX30102:</a:t>
-            </a:r>
-            <a:r>
-              <a:rPr lang="en-US" sz="2000" kern="100" dirty="0">
-                <a:solidFill>
-                  <a:sysClr val="windowText" lastClr="000000"/>
-                </a:solidFill>
-                <a:effectLst/>
-                <a:latin typeface="Aptos" panose="020B0004020202020204" pitchFamily="34" charset="0"/>
-                <a:ea typeface="Aptos" panose="020B0004020202020204" pitchFamily="34" charset="0"/>
-                <a:cs typeface="Times New Roman" panose="02020603050405020304" pitchFamily="18" charset="0"/>
-              </a:rPr>
-              <a:t> An optical sensor that measures </a:t>
-            </a:r>
-            <a:r>
-              <a:rPr lang="en-US" sz="2000" b="1" kern="100" dirty="0">
-                <a:solidFill>
-                  <a:srgbClr val="0070C0"/>
-                </a:solidFill>
-                <a:effectLst/>
-                <a:latin typeface="Aptos" panose="020B0004020202020204" pitchFamily="34" charset="0"/>
-                <a:ea typeface="Aptos" panose="020B0004020202020204" pitchFamily="34" charset="0"/>
-                <a:cs typeface="Times New Roman" panose="02020603050405020304" pitchFamily="18" charset="0"/>
-              </a:rPr>
-              <a:t>heart rate and blood oxygen saturation </a:t>
-            </a:r>
-            <a:r>
-              <a:rPr lang="en-US" sz="2000" kern="100" dirty="0">
-                <a:solidFill>
-                  <a:sysClr val="windowText" lastClr="000000"/>
-                </a:solidFill>
-                <a:effectLst/>
-                <a:latin typeface="Aptos" panose="020B0004020202020204" pitchFamily="34" charset="0"/>
-                <a:ea typeface="Aptos" panose="020B0004020202020204" pitchFamily="34" charset="0"/>
-                <a:cs typeface="Times New Roman" panose="02020603050405020304" pitchFamily="18" charset="0"/>
-              </a:rPr>
-              <a:t>(SpO₂) using red and infrared LEDs.</a:t>
-            </a:r>
-          </a:p>
-          <a:p>
-            <a:pPr marL="324000" indent="-342900">
-              <a:lnSpc>
-                <a:spcPct val="115000"/>
-              </a:lnSpc>
-              <a:buFont typeface="Arial" panose="020B0604020202020204" pitchFamily="34" charset="0"/>
-              <a:buChar char="•"/>
-            </a:pPr>
-            <a:r>
-              <a:rPr lang="en-US" sz="2000" b="1" kern="100" dirty="0">
-                <a:solidFill>
-                  <a:srgbClr val="0070C0"/>
-                </a:solidFill>
-                <a:effectLst/>
-                <a:latin typeface="Aptos" panose="020B0004020202020204" pitchFamily="34" charset="0"/>
-                <a:ea typeface="Aptos" panose="020B0004020202020204" pitchFamily="34" charset="0"/>
-                <a:cs typeface="Times New Roman" panose="02020603050405020304" pitchFamily="18" charset="0"/>
-              </a:rPr>
-              <a:t>Grove GSR Sensor: </a:t>
-            </a:r>
-            <a:r>
-              <a:rPr lang="en-US" sz="2000" kern="100" dirty="0">
-                <a:solidFill>
-                  <a:sysClr val="windowText" lastClr="000000"/>
-                </a:solidFill>
-                <a:effectLst/>
-                <a:latin typeface="Aptos" panose="020B0004020202020204" pitchFamily="34" charset="0"/>
-                <a:ea typeface="Aptos" panose="020B0004020202020204" pitchFamily="34" charset="0"/>
-                <a:cs typeface="Times New Roman" panose="02020603050405020304" pitchFamily="18" charset="0"/>
-              </a:rPr>
-              <a:t>Measures </a:t>
-            </a:r>
-            <a:r>
-              <a:rPr lang="en-US" sz="2000" b="1" kern="100" dirty="0">
-                <a:solidFill>
-                  <a:srgbClr val="0070C0"/>
-                </a:solidFill>
-                <a:effectLst/>
-                <a:latin typeface="Aptos" panose="020B0004020202020204" pitchFamily="34" charset="0"/>
-                <a:ea typeface="Aptos" panose="020B0004020202020204" pitchFamily="34" charset="0"/>
-                <a:cs typeface="Times New Roman" panose="02020603050405020304" pitchFamily="18" charset="0"/>
-              </a:rPr>
-              <a:t>skin conductance</a:t>
-            </a:r>
-            <a:r>
-              <a:rPr lang="en-US" sz="2000" kern="100" dirty="0">
-                <a:solidFill>
-                  <a:sysClr val="windowText" lastClr="000000"/>
-                </a:solidFill>
-                <a:effectLst/>
-                <a:latin typeface="Aptos" panose="020B0004020202020204" pitchFamily="34" charset="0"/>
-                <a:ea typeface="Aptos" panose="020B0004020202020204" pitchFamily="34" charset="0"/>
-                <a:cs typeface="Times New Roman" panose="02020603050405020304" pitchFamily="18" charset="0"/>
-              </a:rPr>
-              <a:t>, an indicator of stress, by detecting changes in sweat gland activity.</a:t>
-            </a:r>
-          </a:p>
-          <a:p>
-            <a:pPr marL="324000" indent="-342900">
-              <a:lnSpc>
-                <a:spcPct val="115000"/>
-              </a:lnSpc>
-              <a:spcAft>
-                <a:spcPts val="1200"/>
-              </a:spcAft>
-              <a:buFont typeface="Arial" panose="020B0604020202020204" pitchFamily="34" charset="0"/>
-              <a:buChar char="•"/>
-            </a:pPr>
-            <a:r>
-              <a:rPr lang="en-US" sz="2000" b="1" kern="100" dirty="0" err="1">
-                <a:solidFill>
-                  <a:srgbClr val="0070C0"/>
-                </a:solidFill>
-                <a:effectLst/>
-                <a:latin typeface="Aptos" panose="020B0004020202020204" pitchFamily="34" charset="0"/>
-                <a:ea typeface="Aptos" panose="020B0004020202020204" pitchFamily="34" charset="0"/>
-                <a:cs typeface="Times New Roman" panose="02020603050405020304" pitchFamily="18" charset="0"/>
-              </a:rPr>
-              <a:t>Plux</a:t>
-            </a:r>
-            <a:r>
-              <a:rPr lang="en-US" sz="2000" b="1" kern="100" dirty="0">
-                <a:solidFill>
-                  <a:srgbClr val="0070C0"/>
-                </a:solidFill>
-                <a:effectLst/>
-                <a:latin typeface="Aptos" panose="020B0004020202020204" pitchFamily="34" charset="0"/>
-                <a:ea typeface="Aptos" panose="020B0004020202020204" pitchFamily="34" charset="0"/>
-                <a:cs typeface="Times New Roman" panose="02020603050405020304" pitchFamily="18" charset="0"/>
-              </a:rPr>
-              <a:t> PZT Sensor: </a:t>
-            </a:r>
-            <a:r>
-              <a:rPr lang="en-US" sz="2000" kern="100" dirty="0">
-                <a:solidFill>
-                  <a:sysClr val="windowText" lastClr="000000"/>
-                </a:solidFill>
-                <a:effectLst/>
-                <a:latin typeface="Aptos" panose="020B0004020202020204" pitchFamily="34" charset="0"/>
-                <a:ea typeface="Aptos" panose="020B0004020202020204" pitchFamily="34" charset="0"/>
-                <a:cs typeface="Times New Roman" panose="02020603050405020304" pitchFamily="18" charset="0"/>
-              </a:rPr>
-              <a:t>Captures </a:t>
-            </a:r>
-            <a:r>
-              <a:rPr lang="en-US" sz="2000" b="1" kern="100" dirty="0">
-                <a:solidFill>
-                  <a:srgbClr val="0070C0"/>
-                </a:solidFill>
-                <a:effectLst/>
-                <a:latin typeface="Aptos" panose="020B0004020202020204" pitchFamily="34" charset="0"/>
-                <a:ea typeface="Aptos" panose="020B0004020202020204" pitchFamily="34" charset="0"/>
-                <a:cs typeface="Times New Roman" panose="02020603050405020304" pitchFamily="18" charset="0"/>
-              </a:rPr>
-              <a:t>respiration rate </a:t>
-            </a:r>
-            <a:r>
-              <a:rPr lang="en-US" sz="2000" kern="100" dirty="0">
-                <a:solidFill>
-                  <a:sysClr val="windowText" lastClr="000000"/>
-                </a:solidFill>
-                <a:effectLst/>
-                <a:latin typeface="Aptos" panose="020B0004020202020204" pitchFamily="34" charset="0"/>
-                <a:ea typeface="Aptos" panose="020B0004020202020204" pitchFamily="34" charset="0"/>
-                <a:cs typeface="Times New Roman" panose="02020603050405020304" pitchFamily="18" charset="0"/>
-              </a:rPr>
-              <a:t>using a piezoelectric belt that detects chest movement.</a:t>
-            </a:r>
-          </a:p>
-          <a:p>
-            <a:pPr>
-              <a:lnSpc>
-                <a:spcPct val="115000"/>
-              </a:lnSpc>
-              <a:spcAft>
-                <a:spcPts val="800"/>
-              </a:spcAft>
-            </a:pPr>
-            <a:r>
-              <a:rPr lang="en-US" sz="2000" kern="100" dirty="0">
-                <a:solidFill>
-                  <a:sysClr val="windowText" lastClr="000000"/>
-                </a:solidFill>
-                <a:effectLst/>
-                <a:latin typeface="Aptos" panose="020B0004020202020204" pitchFamily="34" charset="0"/>
-                <a:ea typeface="Aptos" panose="020B0004020202020204" pitchFamily="34" charset="0"/>
-                <a:cs typeface="Times New Roman" panose="02020603050405020304" pitchFamily="18" charset="0"/>
-              </a:rPr>
-              <a:t>All sensor data is processed by the ESP32 in real-time and transmitted via Bluetooth Low Energy (BLE) using a custom GATT service. The firmware, written in C++, includes commands for starting/stopping individual or combined measurements. Sensor readings are combined into a single BLE message and sent to the smartphone for visualization.</a:t>
-            </a:r>
           </a:p>
           <a:p>
             <a:pPr>
@@ -3235,8 +3016,8 @@
         </p:nvSpPr>
         <p:spPr>
           <a:xfrm>
-            <a:off x="176473" y="22365856"/>
-            <a:ext cx="20961170" cy="2387381"/>
+            <a:off x="176473" y="22365855"/>
+            <a:ext cx="20961170" cy="2991351"/>
           </a:xfrm>
           <a:prstGeom prst="roundRect">
             <a:avLst/>
@@ -3278,7 +3059,7 @@
                 <a:spcPts val="800"/>
               </a:spcAft>
             </a:pPr>
-            <a:endParaRPr lang="en-US" sz="1400" kern="100" dirty="0">
+            <a:endParaRPr lang="en-US" sz="900" kern="100" dirty="0">
               <a:solidFill>
                 <a:sysClr val="windowText" lastClr="000000"/>
               </a:solidFill>
@@ -3305,7 +3086,337 @@
                 <a:ea typeface="Aptos" panose="020B0004020202020204" pitchFamily="34" charset="0"/>
                 <a:cs typeface="Times New Roman" panose="02020603050405020304" pitchFamily="18" charset="0"/>
               </a:rPr>
-              <a:t>To evaluate the usability and clarity of the stress monitoring app and hardware, a structured user study was designed. Participants were asked to complete a series of tasks, including device pairing, profile setup, individual and combined parameter measurements, and data visualization interpretation.</a:t>
+              <a:t>Participants had a </a:t>
+            </a:r>
+            <a:r>
+              <a:rPr lang="en-US" sz="1800" b="1" kern="100" dirty="0">
+                <a:solidFill>
+                  <a:srgbClr val="FF0000"/>
+                </a:solidFill>
+                <a:latin typeface="Aptos" panose="020B0004020202020204" pitchFamily="34" charset="0"/>
+                <a:ea typeface="Aptos" panose="020B0004020202020204" pitchFamily="34" charset="0"/>
+                <a:cs typeface="Times New Roman" panose="02020603050405020304" pitchFamily="18" charset="0"/>
+              </a:rPr>
+              <a:t>positive </a:t>
+            </a:r>
+            <a:r>
+              <a:rPr lang="en-US" sz="1800" kern="100" dirty="0">
+                <a:solidFill>
+                  <a:schemeClr val="tx1"/>
+                </a:solidFill>
+                <a:latin typeface="Aptos" panose="020B0004020202020204" pitchFamily="34" charset="0"/>
+                <a:ea typeface="Aptos" panose="020B0004020202020204" pitchFamily="34" charset="0"/>
+                <a:cs typeface="Times New Roman" panose="02020603050405020304" pitchFamily="18" charset="0"/>
+              </a:rPr>
+              <a:t>overall impression </a:t>
+            </a:r>
+            <a:r>
+              <a:rPr lang="en-US" sz="1800" kern="100" dirty="0">
+                <a:solidFill>
+                  <a:sysClr val="windowText" lastClr="000000"/>
+                </a:solidFill>
+                <a:latin typeface="Aptos" panose="020B0004020202020204" pitchFamily="34" charset="0"/>
+                <a:ea typeface="Aptos" panose="020B0004020202020204" pitchFamily="34" charset="0"/>
+                <a:cs typeface="Times New Roman" panose="02020603050405020304" pitchFamily="18" charset="0"/>
+              </a:rPr>
+              <a:t>of the app's </a:t>
+            </a:r>
+            <a:r>
+              <a:rPr lang="en-US" sz="1800" b="1" kern="100" dirty="0">
+                <a:solidFill>
+                  <a:srgbClr val="FF0000"/>
+                </a:solidFill>
+                <a:latin typeface="Aptos" panose="020B0004020202020204" pitchFamily="34" charset="0"/>
+                <a:ea typeface="Aptos" panose="020B0004020202020204" pitchFamily="34" charset="0"/>
+                <a:cs typeface="Times New Roman" panose="02020603050405020304" pitchFamily="18" charset="0"/>
+              </a:rPr>
+              <a:t>onboarding experience</a:t>
+            </a:r>
+            <a:r>
+              <a:rPr lang="en-US" sz="1800" kern="100" dirty="0">
+                <a:solidFill>
+                  <a:sysClr val="windowText" lastClr="000000"/>
+                </a:solidFill>
+                <a:latin typeface="Aptos" panose="020B0004020202020204" pitchFamily="34" charset="0"/>
+                <a:ea typeface="Aptos" panose="020B0004020202020204" pitchFamily="34" charset="0"/>
+                <a:cs typeface="Times New Roman" panose="02020603050405020304" pitchFamily="18" charset="0"/>
+              </a:rPr>
+              <a:t>. Device pairing was easy, while </a:t>
+            </a:r>
+            <a:r>
+              <a:rPr lang="en-US" sz="1800" b="1" kern="100" dirty="0">
+                <a:solidFill>
+                  <a:srgbClr val="FF0000"/>
+                </a:solidFill>
+                <a:latin typeface="Aptos" panose="020B0004020202020204" pitchFamily="34" charset="0"/>
+                <a:ea typeface="Aptos" panose="020B0004020202020204" pitchFamily="34" charset="0"/>
+                <a:cs typeface="Times New Roman" panose="02020603050405020304" pitchFamily="18" charset="0"/>
+              </a:rPr>
+              <a:t>profile management</a:t>
+            </a:r>
+            <a:r>
+              <a:rPr lang="en-US" sz="1800" kern="100" dirty="0">
+                <a:solidFill>
+                  <a:sysClr val="windowText" lastClr="000000"/>
+                </a:solidFill>
+                <a:latin typeface="Aptos" panose="020B0004020202020204" pitchFamily="34" charset="0"/>
+                <a:ea typeface="Aptos" panose="020B0004020202020204" pitchFamily="34" charset="0"/>
+                <a:cs typeface="Times New Roman" panose="02020603050405020304" pitchFamily="18" charset="0"/>
+              </a:rPr>
+              <a:t> was slightly </a:t>
+            </a:r>
+            <a:r>
+              <a:rPr lang="en-US" sz="1800" b="1" kern="100" dirty="0">
+                <a:solidFill>
+                  <a:srgbClr val="FF0000"/>
+                </a:solidFill>
+                <a:latin typeface="Aptos" panose="020B0004020202020204" pitchFamily="34" charset="0"/>
+                <a:ea typeface="Aptos" panose="020B0004020202020204" pitchFamily="34" charset="0"/>
+                <a:cs typeface="Times New Roman" panose="02020603050405020304" pitchFamily="18" charset="0"/>
+              </a:rPr>
+              <a:t>less intuitive</a:t>
+            </a:r>
+            <a:r>
+              <a:rPr lang="en-US" sz="1800" kern="100" dirty="0">
+                <a:solidFill>
+                  <a:sysClr val="windowText" lastClr="000000"/>
+                </a:solidFill>
+                <a:latin typeface="Aptos" panose="020B0004020202020204" pitchFamily="34" charset="0"/>
+                <a:ea typeface="Aptos" panose="020B0004020202020204" pitchFamily="34" charset="0"/>
+                <a:cs typeface="Times New Roman" panose="02020603050405020304" pitchFamily="18" charset="0"/>
+              </a:rPr>
+              <a:t>. Some users were </a:t>
+            </a:r>
+            <a:r>
+              <a:rPr lang="en-US" sz="1800" b="1" kern="100" dirty="0">
+                <a:solidFill>
+                  <a:srgbClr val="FF0000"/>
+                </a:solidFill>
+                <a:latin typeface="Aptos" panose="020B0004020202020204" pitchFamily="34" charset="0"/>
+                <a:ea typeface="Aptos" panose="020B0004020202020204" pitchFamily="34" charset="0"/>
+                <a:cs typeface="Times New Roman" panose="02020603050405020304" pitchFamily="18" charset="0"/>
+              </a:rPr>
+              <a:t>confused by </a:t>
+            </a:r>
+            <a:r>
+              <a:rPr lang="en-US" sz="1800" kern="100" dirty="0">
+                <a:solidFill>
+                  <a:sysClr val="windowText" lastClr="000000"/>
+                </a:solidFill>
+                <a:latin typeface="Aptos" panose="020B0004020202020204" pitchFamily="34" charset="0"/>
+                <a:ea typeface="Aptos" panose="020B0004020202020204" pitchFamily="34" charset="0"/>
+                <a:cs typeface="Times New Roman" panose="02020603050405020304" pitchFamily="18" charset="0"/>
+              </a:rPr>
+              <a:t>the </a:t>
+            </a:r>
+            <a:r>
+              <a:rPr lang="en-US" sz="1800" b="1" kern="100" dirty="0">
+                <a:solidFill>
+                  <a:srgbClr val="FF0000"/>
+                </a:solidFill>
+                <a:latin typeface="Aptos" panose="020B0004020202020204" pitchFamily="34" charset="0"/>
+                <a:ea typeface="Aptos" panose="020B0004020202020204" pitchFamily="34" charset="0"/>
+                <a:cs typeface="Times New Roman" panose="02020603050405020304" pitchFamily="18" charset="0"/>
+              </a:rPr>
+              <a:t>identical login screens</a:t>
+            </a:r>
+            <a:r>
+              <a:rPr lang="en-US" sz="1800" kern="100" dirty="0">
+                <a:solidFill>
+                  <a:sysClr val="windowText" lastClr="000000"/>
+                </a:solidFill>
+                <a:latin typeface="Aptos" panose="020B0004020202020204" pitchFamily="34" charset="0"/>
+                <a:ea typeface="Aptos" panose="020B0004020202020204" pitchFamily="34" charset="0"/>
+                <a:cs typeface="Times New Roman" panose="02020603050405020304" pitchFamily="18" charset="0"/>
+              </a:rPr>
+              <a:t> for </a:t>
+            </a:r>
+            <a:r>
+              <a:rPr lang="en-US" sz="1800" b="1" kern="100" dirty="0">
+                <a:solidFill>
+                  <a:srgbClr val="FF0000"/>
+                </a:solidFill>
+                <a:latin typeface="Aptos" panose="020B0004020202020204" pitchFamily="34" charset="0"/>
+                <a:ea typeface="Aptos" panose="020B0004020202020204" pitchFamily="34" charset="0"/>
+                <a:cs typeface="Times New Roman" panose="02020603050405020304" pitchFamily="18" charset="0"/>
+              </a:rPr>
+              <a:t>new and existing users</a:t>
+            </a:r>
+            <a:r>
+              <a:rPr lang="en-US" sz="1800" kern="100" dirty="0">
+                <a:solidFill>
+                  <a:sysClr val="windowText" lastClr="000000"/>
+                </a:solidFill>
+                <a:latin typeface="Aptos" panose="020B0004020202020204" pitchFamily="34" charset="0"/>
+                <a:ea typeface="Aptos" panose="020B0004020202020204" pitchFamily="34" charset="0"/>
+                <a:cs typeface="Times New Roman" panose="02020603050405020304" pitchFamily="18" charset="0"/>
+              </a:rPr>
+              <a:t>. Starting a measurement was generally straightforward. The </a:t>
+            </a:r>
+            <a:r>
+              <a:rPr lang="en-US" sz="1800" b="1" kern="100" dirty="0">
+                <a:solidFill>
+                  <a:srgbClr val="FF0000"/>
+                </a:solidFill>
+                <a:latin typeface="Aptos" panose="020B0004020202020204" pitchFamily="34" charset="0"/>
+                <a:ea typeface="Aptos" panose="020B0004020202020204" pitchFamily="34" charset="0"/>
+                <a:cs typeface="Times New Roman" panose="02020603050405020304" pitchFamily="18" charset="0"/>
+              </a:rPr>
+              <a:t>app’s layout was clear</a:t>
+            </a:r>
+            <a:r>
+              <a:rPr lang="en-US" sz="1800" kern="100" dirty="0">
+                <a:solidFill>
+                  <a:sysClr val="windowText" lastClr="000000"/>
+                </a:solidFill>
+                <a:latin typeface="Aptos" panose="020B0004020202020204" pitchFamily="34" charset="0"/>
+                <a:ea typeface="Aptos" panose="020B0004020202020204" pitchFamily="34" charset="0"/>
+                <a:cs typeface="Times New Roman" panose="02020603050405020304" pitchFamily="18" charset="0"/>
+              </a:rPr>
+              <a:t>, and the display of results was well received. Visual elements like gauges and progress indicators were appreciated, with the </a:t>
+            </a:r>
+            <a:r>
+              <a:rPr lang="en-US" sz="1800" b="1" kern="100" dirty="0">
+                <a:solidFill>
+                  <a:srgbClr val="FF0000"/>
+                </a:solidFill>
+                <a:latin typeface="Aptos" panose="020B0004020202020204" pitchFamily="34" charset="0"/>
+                <a:ea typeface="Aptos" panose="020B0004020202020204" pitchFamily="34" charset="0"/>
+                <a:cs typeface="Times New Roman" panose="02020603050405020304" pitchFamily="18" charset="0"/>
+              </a:rPr>
+              <a:t>color-coded system </a:t>
+            </a:r>
+            <a:r>
+              <a:rPr lang="en-US" sz="1800" kern="100" dirty="0">
+                <a:solidFill>
+                  <a:sysClr val="windowText" lastClr="000000"/>
+                </a:solidFill>
+                <a:latin typeface="Aptos" panose="020B0004020202020204" pitchFamily="34" charset="0"/>
+                <a:ea typeface="Aptos" panose="020B0004020202020204" pitchFamily="34" charset="0"/>
+                <a:cs typeface="Times New Roman" panose="02020603050405020304" pitchFamily="18" charset="0"/>
+              </a:rPr>
+              <a:t>especially </a:t>
+            </a:r>
+            <a:r>
+              <a:rPr lang="en-US" sz="1800" b="1" kern="100" dirty="0">
+                <a:solidFill>
+                  <a:srgbClr val="FF0000"/>
+                </a:solidFill>
+                <a:latin typeface="Aptos" panose="020B0004020202020204" pitchFamily="34" charset="0"/>
+                <a:ea typeface="Aptos" panose="020B0004020202020204" pitchFamily="34" charset="0"/>
+                <a:cs typeface="Times New Roman" panose="02020603050405020304" pitchFamily="18" charset="0"/>
+              </a:rPr>
+              <a:t>helpful</a:t>
+            </a:r>
+            <a:r>
+              <a:rPr lang="en-US" sz="1800" kern="100" dirty="0">
+                <a:solidFill>
+                  <a:sysClr val="windowText" lastClr="000000"/>
+                </a:solidFill>
+                <a:latin typeface="Aptos" panose="020B0004020202020204" pitchFamily="34" charset="0"/>
+                <a:ea typeface="Aptos" panose="020B0004020202020204" pitchFamily="34" charset="0"/>
+                <a:cs typeface="Times New Roman" panose="02020603050405020304" pitchFamily="18" charset="0"/>
+              </a:rPr>
+              <a:t> for interpreting values. Text content supported user understanding—particularly of the stress level indicator—though one participant found the amount of information a bit much. </a:t>
+            </a:r>
+            <a:r>
+              <a:rPr lang="en-US" sz="1800" b="1" kern="100" dirty="0">
+                <a:solidFill>
+                  <a:srgbClr val="FF0000"/>
+                </a:solidFill>
+                <a:latin typeface="Aptos" panose="020B0004020202020204" pitchFamily="34" charset="0"/>
+                <a:ea typeface="Aptos" panose="020B0004020202020204" pitchFamily="34" charset="0"/>
+                <a:cs typeface="Times New Roman" panose="02020603050405020304" pitchFamily="18" charset="0"/>
+              </a:rPr>
+              <a:t>Graphs were preferred</a:t>
+            </a:r>
+            <a:r>
+              <a:rPr lang="en-US" sz="1800" kern="100" dirty="0">
+                <a:solidFill>
+                  <a:sysClr val="windowText" lastClr="000000"/>
+                </a:solidFill>
+                <a:latin typeface="Aptos" panose="020B0004020202020204" pitchFamily="34" charset="0"/>
+                <a:ea typeface="Aptos" panose="020B0004020202020204" pitchFamily="34" charset="0"/>
+                <a:cs typeface="Times New Roman" panose="02020603050405020304" pitchFamily="18" charset="0"/>
+              </a:rPr>
+              <a:t> over tables for viewing data trends, but some users were unaware that the 30-day graph was interactive, leading to confusion about min/max values. The table format for min/max was considered unclear. The history function was fairly easy to access, and filtering by date was intuitive. </a:t>
+            </a:r>
+            <a:r>
+              <a:rPr lang="en-US" sz="1800" b="1" kern="100" dirty="0">
+                <a:solidFill>
+                  <a:srgbClr val="FF0000"/>
+                </a:solidFill>
+                <a:latin typeface="Aptos" panose="020B0004020202020204" pitchFamily="34" charset="0"/>
+                <a:ea typeface="Aptos" panose="020B0004020202020204" pitchFamily="34" charset="0"/>
+                <a:cs typeface="Times New Roman" panose="02020603050405020304" pitchFamily="18" charset="0"/>
+              </a:rPr>
+              <a:t>Gauge settings </a:t>
+            </a:r>
+            <a:r>
+              <a:rPr lang="en-US" sz="1800" kern="100" dirty="0">
+                <a:solidFill>
+                  <a:sysClr val="windowText" lastClr="000000"/>
+                </a:solidFill>
+                <a:latin typeface="Aptos" panose="020B0004020202020204" pitchFamily="34" charset="0"/>
+                <a:ea typeface="Aptos" panose="020B0004020202020204" pitchFamily="34" charset="0"/>
+                <a:cs typeface="Times New Roman" panose="02020603050405020304" pitchFamily="18" charset="0"/>
+              </a:rPr>
+              <a:t>were user-friendly, but their </a:t>
+            </a:r>
+            <a:r>
+              <a:rPr lang="en-US" sz="1800" b="1" kern="100" dirty="0">
+                <a:solidFill>
+                  <a:srgbClr val="FF0000"/>
+                </a:solidFill>
+                <a:latin typeface="Aptos" panose="020B0004020202020204" pitchFamily="34" charset="0"/>
+                <a:ea typeface="Aptos" panose="020B0004020202020204" pitchFamily="34" charset="0"/>
+                <a:cs typeface="Times New Roman" panose="02020603050405020304" pitchFamily="18" charset="0"/>
+              </a:rPr>
+              <a:t>usefulness</a:t>
+            </a:r>
+            <a:r>
+              <a:rPr lang="en-US" sz="1800" b="1" kern="100" dirty="0">
+                <a:solidFill>
+                  <a:sysClr val="windowText" lastClr="000000"/>
+                </a:solidFill>
+                <a:latin typeface="Aptos" panose="020B0004020202020204" pitchFamily="34" charset="0"/>
+                <a:ea typeface="Aptos" panose="020B0004020202020204" pitchFamily="34" charset="0"/>
+                <a:cs typeface="Times New Roman" panose="02020603050405020304" pitchFamily="18" charset="0"/>
+              </a:rPr>
+              <a:t> </a:t>
+            </a:r>
+            <a:r>
+              <a:rPr lang="en-US" sz="1800" kern="100" dirty="0">
+                <a:solidFill>
+                  <a:sysClr val="windowText" lastClr="000000"/>
+                </a:solidFill>
+                <a:latin typeface="Aptos" panose="020B0004020202020204" pitchFamily="34" charset="0"/>
+                <a:ea typeface="Aptos" panose="020B0004020202020204" pitchFamily="34" charset="0"/>
+                <a:cs typeface="Times New Roman" panose="02020603050405020304" pitchFamily="18" charset="0"/>
+              </a:rPr>
+              <a:t>was </a:t>
+            </a:r>
+            <a:r>
+              <a:rPr lang="en-US" sz="1800" b="1" kern="100" dirty="0">
+                <a:solidFill>
+                  <a:srgbClr val="FF0000"/>
+                </a:solidFill>
+                <a:latin typeface="Aptos" panose="020B0004020202020204" pitchFamily="34" charset="0"/>
+                <a:ea typeface="Aptos" panose="020B0004020202020204" pitchFamily="34" charset="0"/>
+                <a:cs typeface="Times New Roman" panose="02020603050405020304" pitchFamily="18" charset="0"/>
+              </a:rPr>
+              <a:t>unclear</a:t>
+            </a:r>
+            <a:r>
+              <a:rPr lang="en-US" sz="1800" kern="100" dirty="0">
+                <a:solidFill>
+                  <a:sysClr val="windowText" lastClr="000000"/>
+                </a:solidFill>
+                <a:latin typeface="Aptos" panose="020B0004020202020204" pitchFamily="34" charset="0"/>
+                <a:ea typeface="Aptos" panose="020B0004020202020204" pitchFamily="34" charset="0"/>
+                <a:cs typeface="Times New Roman" panose="02020603050405020304" pitchFamily="18" charset="0"/>
+              </a:rPr>
+              <a:t> to some.</a:t>
             </a:r>
           </a:p>
           <a:p>
@@ -3322,156 +3433,55 @@
                 <a:solidFill>
                   <a:sysClr val="windowText" lastClr="000000"/>
                 </a:solidFill>
-                <a:effectLst/>
-                <a:latin typeface="Aptos" panose="020B0004020202020204" pitchFamily="34" charset="0"/>
-                <a:ea typeface="Aptos" panose="020B0004020202020204" pitchFamily="34" charset="0"/>
-                <a:cs typeface="Times New Roman" panose="02020603050405020304" pitchFamily="18" charset="0"/>
-              </a:rPr>
-              <a:t>Most users found the Bluetooth pairing process straightforward and rated the interface as </a:t>
+                <a:latin typeface="Aptos" panose="020B0004020202020204" pitchFamily="34" charset="0"/>
+                <a:ea typeface="Aptos" panose="020B0004020202020204" pitchFamily="34" charset="0"/>
+                <a:cs typeface="Times New Roman" panose="02020603050405020304" pitchFamily="18" charset="0"/>
+              </a:rPr>
+              <a:t>Overall, the app was </a:t>
             </a:r>
             <a:r>
               <a:rPr lang="en-US" sz="1800" b="1" kern="100" dirty="0">
                 <a:solidFill>
                   <a:srgbClr val="FF0000"/>
                 </a:solidFill>
-                <a:effectLst/>
-                <a:latin typeface="Aptos" panose="020B0004020202020204" pitchFamily="34" charset="0"/>
-                <a:ea typeface="Aptos" panose="020B0004020202020204" pitchFamily="34" charset="0"/>
-                <a:cs typeface="Times New Roman" panose="02020603050405020304" pitchFamily="18" charset="0"/>
-              </a:rPr>
-              <a:t>intuitive and easy to navigate</a:t>
+                <a:latin typeface="Aptos" panose="020B0004020202020204" pitchFamily="34" charset="0"/>
+                <a:ea typeface="Aptos" panose="020B0004020202020204" pitchFamily="34" charset="0"/>
+                <a:cs typeface="Times New Roman" panose="02020603050405020304" pitchFamily="18" charset="0"/>
+              </a:rPr>
+              <a:t>easy to use</a:t>
             </a:r>
             <a:r>
               <a:rPr lang="en-US" sz="1800" kern="100" dirty="0">
                 <a:solidFill>
                   <a:sysClr val="windowText" lastClr="000000"/>
                 </a:solidFill>
-                <a:effectLst/>
-                <a:latin typeface="Aptos" panose="020B0004020202020204" pitchFamily="34" charset="0"/>
-                <a:ea typeface="Aptos" panose="020B0004020202020204" pitchFamily="34" charset="0"/>
-                <a:cs typeface="Times New Roman" panose="02020603050405020304" pitchFamily="18" charset="0"/>
-              </a:rPr>
-              <a:t>. Users appreciated the </a:t>
+                <a:latin typeface="Aptos" panose="020B0004020202020204" pitchFamily="34" charset="0"/>
+                <a:ea typeface="Aptos" panose="020B0004020202020204" pitchFamily="34" charset="0"/>
+                <a:cs typeface="Times New Roman" panose="02020603050405020304" pitchFamily="18" charset="0"/>
+              </a:rPr>
+              <a:t>, required little support, and was accessible to novices. However, </a:t>
             </a:r>
             <a:r>
               <a:rPr lang="en-US" sz="1800" b="1" kern="100" dirty="0">
                 <a:solidFill>
                   <a:srgbClr val="FF0000"/>
                 </a:solidFill>
-                <a:effectLst/>
-                <a:latin typeface="Aptos" panose="020B0004020202020204" pitchFamily="34" charset="0"/>
-                <a:ea typeface="Aptos" panose="020B0004020202020204" pitchFamily="34" charset="0"/>
-                <a:cs typeface="Times New Roman" panose="02020603050405020304" pitchFamily="18" charset="0"/>
-              </a:rPr>
-              <a:t>visual clarity </a:t>
+                <a:latin typeface="Aptos" panose="020B0004020202020204" pitchFamily="34" charset="0"/>
+                <a:ea typeface="Aptos" panose="020B0004020202020204" pitchFamily="34" charset="0"/>
+                <a:cs typeface="Times New Roman" panose="02020603050405020304" pitchFamily="18" charset="0"/>
+              </a:rPr>
+              <a:t>motivation for daily use was low</a:t>
             </a:r>
             <a:r>
               <a:rPr lang="en-US" sz="1800" kern="100" dirty="0">
                 <a:solidFill>
                   <a:sysClr val="windowText" lastClr="000000"/>
                 </a:solidFill>
-                <a:effectLst/>
-                <a:latin typeface="Aptos" panose="020B0004020202020204" pitchFamily="34" charset="0"/>
-                <a:ea typeface="Aptos" panose="020B0004020202020204" pitchFamily="34" charset="0"/>
-                <a:cs typeface="Times New Roman" panose="02020603050405020304" pitchFamily="18" charset="0"/>
-              </a:rPr>
-              <a:t>of health data, with color-coded gauges and stress indicators aiding interpretation. The </a:t>
-            </a:r>
-            <a:r>
-              <a:rPr lang="en-US" sz="1800" b="1" kern="100" dirty="0">
-                <a:solidFill>
-                  <a:srgbClr val="FF0000"/>
-                </a:solidFill>
-                <a:effectLst/>
-                <a:latin typeface="Aptos" panose="020B0004020202020204" pitchFamily="34" charset="0"/>
-                <a:ea typeface="Aptos" panose="020B0004020202020204" pitchFamily="34" charset="0"/>
-                <a:cs typeface="Times New Roman" panose="02020603050405020304" pitchFamily="18" charset="0"/>
-              </a:rPr>
-              <a:t>info dialogs and explanations</a:t>
-            </a:r>
-            <a:r>
-              <a:rPr lang="en-US" sz="1800" kern="100" dirty="0">
-                <a:solidFill>
-                  <a:sysClr val="windowText" lastClr="000000"/>
-                </a:solidFill>
-                <a:effectLst/>
-                <a:latin typeface="Aptos" panose="020B0004020202020204" pitchFamily="34" charset="0"/>
-                <a:ea typeface="Aptos" panose="020B0004020202020204" pitchFamily="34" charset="0"/>
-                <a:cs typeface="Times New Roman" panose="02020603050405020304" pitchFamily="18" charset="0"/>
-              </a:rPr>
-              <a:t> for parameters were found to be </a:t>
-            </a:r>
-            <a:r>
-              <a:rPr lang="en-US" sz="1800" b="1" kern="100" dirty="0">
-                <a:solidFill>
-                  <a:srgbClr val="FF0000"/>
-                </a:solidFill>
-                <a:effectLst/>
-                <a:latin typeface="Aptos" panose="020B0004020202020204" pitchFamily="34" charset="0"/>
-                <a:ea typeface="Aptos" panose="020B0004020202020204" pitchFamily="34" charset="0"/>
-                <a:cs typeface="Times New Roman" panose="02020603050405020304" pitchFamily="18" charset="0"/>
-              </a:rPr>
-              <a:t>helpful</a:t>
-            </a:r>
-            <a:r>
-              <a:rPr lang="en-US" sz="1800" kern="100" dirty="0">
-                <a:solidFill>
-                  <a:sysClr val="windowText" lastClr="000000"/>
-                </a:solidFill>
-                <a:effectLst/>
-                <a:latin typeface="Aptos" panose="020B0004020202020204" pitchFamily="34" charset="0"/>
-                <a:ea typeface="Aptos" panose="020B0004020202020204" pitchFamily="34" charset="0"/>
-                <a:cs typeface="Times New Roman" panose="02020603050405020304" pitchFamily="18" charset="0"/>
-              </a:rPr>
-              <a:t> by most participants, especially for understanding stress-related values such as GSR and respiratory rate. The </a:t>
-            </a:r>
-            <a:r>
-              <a:rPr lang="en-US" sz="1800" b="1" kern="100" dirty="0">
-                <a:solidFill>
-                  <a:srgbClr val="FF0000"/>
-                </a:solidFill>
-                <a:effectLst/>
-                <a:latin typeface="Aptos" panose="020B0004020202020204" pitchFamily="34" charset="0"/>
-                <a:ea typeface="Aptos" panose="020B0004020202020204" pitchFamily="34" charset="0"/>
-                <a:cs typeface="Times New Roman" panose="02020603050405020304" pitchFamily="18" charset="0"/>
-              </a:rPr>
-              <a:t>history feature</a:t>
-            </a:r>
-            <a:r>
-              <a:rPr lang="en-US" sz="1800" kern="100" dirty="0">
-                <a:solidFill>
-                  <a:sysClr val="windowText" lastClr="000000"/>
-                </a:solidFill>
-                <a:effectLst/>
-                <a:latin typeface="Aptos" panose="020B0004020202020204" pitchFamily="34" charset="0"/>
-                <a:ea typeface="Aptos" panose="020B0004020202020204" pitchFamily="34" charset="0"/>
-                <a:cs typeface="Times New Roman" panose="02020603050405020304" pitchFamily="18" charset="0"/>
-              </a:rPr>
-              <a:t>, including graph/table views and date filtering, was highlighted as </a:t>
-            </a:r>
-            <a:r>
-              <a:rPr lang="en-US" sz="1800" b="1" kern="100" dirty="0">
-                <a:solidFill>
-                  <a:srgbClr val="FF0000"/>
-                </a:solidFill>
-                <a:effectLst/>
-                <a:latin typeface="Aptos" panose="020B0004020202020204" pitchFamily="34" charset="0"/>
-                <a:ea typeface="Aptos" panose="020B0004020202020204" pitchFamily="34" charset="0"/>
-                <a:cs typeface="Times New Roman" panose="02020603050405020304" pitchFamily="18" charset="0"/>
-              </a:rPr>
-              <a:t>useful for monitoring trends over time</a:t>
-            </a:r>
-            <a:r>
-              <a:rPr lang="en-US" sz="1800" kern="100" dirty="0">
-                <a:solidFill>
-                  <a:sysClr val="windowText" lastClr="000000"/>
-                </a:solidFill>
-                <a:effectLst/>
-                <a:latin typeface="Aptos" panose="020B0004020202020204" pitchFamily="34" charset="0"/>
-                <a:ea typeface="Aptos" panose="020B0004020202020204" pitchFamily="34" charset="0"/>
-                <a:cs typeface="Times New Roman" panose="02020603050405020304" pitchFamily="18" charset="0"/>
-              </a:rPr>
-              <a:t>. Some users indicated that switching between views helped them better understand fluctuations in their stress levels.</a:t>
+                <a:latin typeface="Aptos" panose="020B0004020202020204" pitchFamily="34" charset="0"/>
+                <a:ea typeface="Aptos" panose="020B0004020202020204" pitchFamily="34" charset="0"/>
+                <a:cs typeface="Times New Roman" panose="02020603050405020304" pitchFamily="18" charset="0"/>
+              </a:rPr>
+              <a:t>, pointing to a lack of perceived long-term value. Confidence in the app was moderate, with minimal prior knowledge needed.</a:t>
             </a:r>
             <a:endParaRPr lang="en-GB" sz="1800" kern="100" dirty="0">
               <a:solidFill>
@@ -3499,7 +3509,7 @@
         </p:nvSpPr>
         <p:spPr>
           <a:xfrm>
-            <a:off x="8379144" y="21984098"/>
+            <a:off x="8379144" y="21955223"/>
             <a:ext cx="4270278" cy="750843"/>
           </a:xfrm>
           <a:prstGeom prst="roundRect">
@@ -3558,8 +3568,8 @@
         </p:nvSpPr>
         <p:spPr>
           <a:xfrm>
-            <a:off x="188197" y="25372230"/>
-            <a:ext cx="20961170" cy="1819197"/>
+            <a:off x="188197" y="26049271"/>
+            <a:ext cx="20961170" cy="1389136"/>
           </a:xfrm>
           <a:prstGeom prst="roundRect">
             <a:avLst/>
@@ -3601,28 +3611,13 @@
                 <a:spcPts val="800"/>
               </a:spcAft>
             </a:pPr>
-            <a:endParaRPr lang="en-US" sz="400" dirty="0">
-              <a:solidFill>
-                <a:schemeClr val="tx1"/>
-              </a:solidFill>
-            </a:endParaRPr>
-          </a:p>
-          <a:p>
-            <a:pPr>
-              <a:lnSpc>
-                <a:spcPct val="115000"/>
-              </a:lnSpc>
-              <a:spcAft>
-                <a:spcPts val="800"/>
-              </a:spcAft>
-            </a:pPr>
             <a:r>
               <a:rPr lang="en-US" sz="2000" dirty="0">
                 <a:solidFill>
                   <a:schemeClr val="tx1"/>
                 </a:solidFill>
               </a:rPr>
-              <a:t>This project demonstrates the feasibility of a </a:t>
+              <a:t>This project demonstrates the potential of a </a:t>
             </a:r>
             <a:r>
               <a:rPr lang="en-US" sz="2000" b="1" dirty="0">
@@ -3630,7 +3625,7 @@
                   <a:srgbClr val="FF0000"/>
                 </a:solidFill>
               </a:rPr>
-              <a:t>low-cost, user-friendly health monitoring system </a:t>
+              <a:t>low-cost, user-friendly toolkit </a:t>
             </a:r>
             <a:r>
               <a:rPr lang="en-US" sz="2000" dirty="0">
@@ -3638,7 +3633,7 @@
                   <a:schemeClr val="tx1"/>
                 </a:solidFill>
               </a:rPr>
-              <a:t>that combines physiological sensors with real-time data visualization in a mobile application. By integrating heart rate, GSR, oxygen saturation, and respiration rate measurements, the system offers a </a:t>
+              <a:t>for real-time </a:t>
             </a:r>
             <a:r>
               <a:rPr lang="en-US" sz="2000" b="1" dirty="0">
@@ -3646,7 +3641,7 @@
                   <a:srgbClr val="FF0000"/>
                 </a:solidFill>
               </a:rPr>
-              <a:t>comprehensive view </a:t>
+              <a:t>monitoring of workplace well-being </a:t>
             </a:r>
             <a:r>
               <a:rPr lang="en-US" sz="2000" dirty="0">
@@ -3654,7 +3649,7 @@
                   <a:schemeClr val="tx1"/>
                 </a:solidFill>
               </a:rPr>
-              <a:t>of workplace stress. Preliminary user feedback suggests that the app is </a:t>
+              <a:t>using physiological sensors and open-source hardware. By </a:t>
             </a:r>
             <a:r>
               <a:rPr lang="en-US" sz="2000" b="1" dirty="0">
@@ -3662,7 +3657,7 @@
                   <a:srgbClr val="FF0000"/>
                 </a:solidFill>
               </a:rPr>
-              <a:t>intuitive</a:t>
+              <a:t>prioritizing accessibility and usability</a:t>
             </a:r>
             <a:r>
               <a:rPr lang="en-US" sz="2000" dirty="0">
@@ -3670,7 +3665,7 @@
                   <a:schemeClr val="tx1"/>
                 </a:solidFill>
               </a:rPr>
-              <a:t>, the data is presented clearly, and the system has </a:t>
+              <a:t>, it offers a practical alternative to commercial systems. The modular design supports future research and development, laying the groundwork for scalable, data-driven health interventions in occupational settings. With </a:t>
             </a:r>
             <a:r>
               <a:rPr lang="en-US" sz="2000" b="1" dirty="0">
@@ -3678,7 +3673,7 @@
                   <a:srgbClr val="FF0000"/>
                 </a:solidFill>
               </a:rPr>
-              <a:t>the potential to raise awareness </a:t>
+              <a:t>further refinement</a:t>
             </a:r>
             <a:r>
               <a:rPr lang="en-US" sz="2000" dirty="0">
@@ -3686,7 +3681,23 @@
                   <a:schemeClr val="tx1"/>
                 </a:solidFill>
               </a:rPr>
-              <a:t>about personal well-being. While more testing is needed to fully evaluate usability and effectiveness, this solution lays a strong foundation for future developments in accessible health monitoring technologies.</a:t>
+              <a:t>, the system could play a </a:t>
+            </a:r>
+            <a:r>
+              <a:rPr lang="en-US" sz="2000" b="1" dirty="0">
+                <a:solidFill>
+                  <a:srgbClr val="FF0000"/>
+                </a:solidFill>
+              </a:rPr>
+              <a:t>key role in promoting healthier, more productive work environments</a:t>
+            </a:r>
+            <a:r>
+              <a:rPr lang="en-US" sz="2000" dirty="0">
+                <a:solidFill>
+                  <a:schemeClr val="tx1"/>
+                </a:solidFill>
+              </a:rPr>
+              <a:t>.</a:t>
             </a:r>
             <a:endParaRPr lang="en-GB" sz="2000" dirty="0">
               <a:solidFill>
@@ -3710,7 +3721,7 @@
         </p:nvSpPr>
         <p:spPr>
           <a:xfrm>
-            <a:off x="8390868" y="24873522"/>
+            <a:off x="8390868" y="25431787"/>
             <a:ext cx="4270278" cy="813135"/>
           </a:xfrm>
           <a:prstGeom prst="roundRect">
@@ -3897,7 +3908,7 @@
                 <a:ea typeface="Aptos" panose="020B0004020202020204" pitchFamily="34" charset="0"/>
                 <a:cs typeface="Times New Roman" panose="02020603050405020304" pitchFamily="18" charset="0"/>
               </a:rPr>
-              <a:t>. The app enables real-time monitoring and historical tracking of key physiological signals, making stress and health data accessible and understandable, even for non-technical users. Below is a summary of the main features and the reasons behind each design choice:</a:t>
+              <a:t>. The app enables real-time monitoring and historical tracking of key physiological signals, making stress and health data accessible and understandable, even for non-technical users. Below is a summary of the main features and the reasons behind each design choice.</a:t>
             </a:r>
           </a:p>
           <a:p>
@@ -4085,7 +4096,7 @@
                 <a:ea typeface="Aptos" panose="020B0004020202020204" pitchFamily="34" charset="0"/>
                 <a:cs typeface="Times New Roman" panose="02020603050405020304" pitchFamily="18" charset="0"/>
               </a:rPr>
-              <a:t>e 1 shows an example of the heart rate gauge.</a:t>
+              <a:t>e 2 shows an example of the heart rate gauge.</a:t>
             </a:r>
             <a:endParaRPr lang="en-US" sz="2000" kern="100" dirty="0">
               <a:solidFill>
@@ -4214,7 +4225,7 @@
                 <a:ea typeface="Aptos" panose="020B0004020202020204" pitchFamily="34" charset="0"/>
                 <a:cs typeface="Times New Roman" panose="02020603050405020304" pitchFamily="18" charset="0"/>
               </a:rPr>
-              <a:t>Users can review past data in a history view, with filters like “Today” or “Last 7 Days.” As shown in figure 2, </a:t>
+              <a:t>Users can review past data in a history view, with filters like “Today” or “Last 7 Days.” As shown in figure 3, </a:t>
             </a:r>
             <a:r>
               <a:rPr lang="en-US" sz="2000" kern="100" dirty="0">
@@ -4282,7 +4293,31 @@
                 <a:ea typeface="Aptos" panose="020B0004020202020204" pitchFamily="34" charset="0"/>
                 <a:cs typeface="Times New Roman" panose="02020603050405020304" pitchFamily="18" charset="0"/>
               </a:rPr>
-              <a:t>Each health metric has an information button explaining what it measures, how it works, and why it matters. This improves understanding and builds trust in the system. As seen in figure 3, it shows the zones and how this parameter is obtained.</a:t>
+              <a:t>Each health metric has an information button explaining what it measures, how it works, and why it matters. This improves understanding and builds trust in the system. As seen in </a:t>
+            </a:r>
+            <a:r>
+              <a:rPr lang="en-US" sz="2000" kern="100">
+                <a:solidFill>
+                  <a:schemeClr val="tx1"/>
+                </a:solidFill>
+                <a:effectLst/>
+                <a:latin typeface="Aptos" panose="020B0004020202020204" pitchFamily="34" charset="0"/>
+                <a:ea typeface="Aptos" panose="020B0004020202020204" pitchFamily="34" charset="0"/>
+                <a:cs typeface="Times New Roman" panose="02020603050405020304" pitchFamily="18" charset="0"/>
+              </a:rPr>
+              <a:t>figure 4, </a:t>
+            </a:r>
+            <a:r>
+              <a:rPr lang="en-US" sz="2000" kern="100" dirty="0">
+                <a:solidFill>
+                  <a:schemeClr val="tx1"/>
+                </a:solidFill>
+                <a:effectLst/>
+                <a:latin typeface="Aptos" panose="020B0004020202020204" pitchFamily="34" charset="0"/>
+                <a:ea typeface="Aptos" panose="020B0004020202020204" pitchFamily="34" charset="0"/>
+                <a:cs typeface="Times New Roman" panose="02020603050405020304" pitchFamily="18" charset="0"/>
+              </a:rPr>
+              <a:t>it shows the zones and how this parameter is obtained.</a:t>
             </a:r>
             <a:endParaRPr lang="nl-BE" sz="2000" b="1" kern="100" dirty="0">
               <a:solidFill>
@@ -4305,7 +4340,7 @@
       </p:sp>
       <p:pic>
         <p:nvPicPr>
-          <p:cNvPr id="55" name="Afbeelding 54" descr="Afbeelding met tekst, schermopname, nummer, Lettertype&#10;&#10;Door AI gegenereerde inhoud is mogelijk onjuist.">
+          <p:cNvPr id="55" name="Afbeelding 54">
             <a:extLst>
               <a:ext uri="{FF2B5EF4-FFF2-40B4-BE49-F238E27FC236}">
                 <a16:creationId xmlns:a16="http://schemas.microsoft.com/office/drawing/2014/main" id="{5AC1D044-28BB-1161-7141-7CEC35ABC09D}"/>
@@ -4319,14 +4354,13 @@
         </p:nvPicPr>
         <p:blipFill>
           <a:blip r:embed="rId4"/>
-          <a:stretch>
-            <a:fillRect/>
-          </a:stretch>
+          <a:srcRect/>
+          <a:stretch/>
         </p:blipFill>
         <p:spPr>
           <a:xfrm>
-            <a:off x="15290488" y="18462399"/>
-            <a:ext cx="2278904" cy="2732995"/>
+            <a:off x="15290487" y="18375518"/>
+            <a:ext cx="2496810" cy="2820704"/>
           </a:xfrm>
           <a:prstGeom prst="rect">
             <a:avLst/>
@@ -4355,7 +4389,7 @@
         </p:blipFill>
         <p:spPr>
           <a:xfrm>
-            <a:off x="17721091" y="15137606"/>
+            <a:off x="17865467" y="15137606"/>
             <a:ext cx="2682134" cy="4978461"/>
           </a:xfrm>
           <a:prstGeom prst="rect">
@@ -4405,7 +4439,7 @@
                   <a:schemeClr val="tx1"/>
                 </a:solidFill>
               </a:rPr>
-              <a:t> 1: </a:t>
+              <a:t> 2: </a:t>
             </a:r>
             <a:r>
               <a:rPr lang="nl-BE" sz="1400" dirty="0" err="1"/>
@@ -4460,7 +4494,7 @@
         </p:nvSpPr>
         <p:spPr>
           <a:xfrm>
-            <a:off x="17721091" y="20157489"/>
+            <a:off x="17865467" y="20157489"/>
             <a:ext cx="2682134" cy="307777"/>
           </a:xfrm>
           <a:prstGeom prst="rect">
@@ -4488,7 +4522,7 @@
                   <a:schemeClr val="tx1"/>
                 </a:solidFill>
               </a:rPr>
-              <a:t> 3: </a:t>
+              <a:t> 4: </a:t>
             </a:r>
             <a:r>
               <a:rPr lang="nl-BE" sz="1400" dirty="0"/>
@@ -4532,8 +4566,8 @@
         </p:nvSpPr>
         <p:spPr>
           <a:xfrm>
-            <a:off x="15136487" y="21162351"/>
-            <a:ext cx="2577053" cy="523220"/>
+            <a:off x="15207783" y="21157753"/>
+            <a:ext cx="2659758" cy="527818"/>
           </a:xfrm>
           <a:prstGeom prst="rect">
             <a:avLst/>
@@ -4560,7 +4594,7 @@
                   <a:schemeClr val="tx1"/>
                 </a:solidFill>
               </a:rPr>
-              <a:t> 2: </a:t>
+              <a:t> 3: </a:t>
             </a:r>
             <a:r>
               <a:rPr lang="nl-BE" sz="1400" dirty="0" err="1"/>
@@ -4621,6 +4655,711 @@
             <a:r>
               <a:rPr lang="nl-BE" sz="1400" dirty="0"/>
               <a:t>”</a:t>
+            </a:r>
+            <a:endParaRPr lang="nl-BE" sz="1400" dirty="0">
+              <a:solidFill>
+                <a:schemeClr val="tx1"/>
+              </a:solidFill>
+            </a:endParaRPr>
+          </a:p>
+        </p:txBody>
+      </p:sp>
+      <p:sp>
+        <p:nvSpPr>
+          <p:cNvPr id="4" name="Tekstvak 3">
+            <a:extLst>
+              <a:ext uri="{FF2B5EF4-FFF2-40B4-BE49-F238E27FC236}">
+                <a16:creationId xmlns:a16="http://schemas.microsoft.com/office/drawing/2014/main" id="{12703270-C140-55F3-4741-E2593E9E34CB}"/>
+              </a:ext>
+            </a:extLst>
+          </p:cNvPr>
+          <p:cNvSpPr txBox="1"/>
+          <p:nvPr/>
+        </p:nvSpPr>
+        <p:spPr>
+          <a:xfrm>
+            <a:off x="10694195" y="27720758"/>
+            <a:ext cx="10455172" cy="830997"/>
+          </a:xfrm>
+          <a:prstGeom prst="rect">
+            <a:avLst/>
+          </a:prstGeom>
+        </p:spPr>
+        <p:txBody>
+          <a:bodyPr vert="horz" wrap="square" rtlCol="0">
+            <a:spAutoFit/>
+          </a:bodyPr>
+          <a:lstStyle/>
+          <a:p>
+            <a:r>
+              <a:rPr lang="nl-BE" sz="1600" dirty="0">
+                <a:solidFill>
+                  <a:schemeClr val="tx1"/>
+                </a:solidFill>
+                <a:latin typeface="Aptos" panose="020B0004020202020204" pitchFamily="34" charset="0"/>
+              </a:rPr>
+              <a:t>[1]</a:t>
+            </a:r>
+            <a:r>
+              <a:rPr lang="en-US" sz="1600" dirty="0">
+                <a:solidFill>
+                  <a:schemeClr val="tx1"/>
+                </a:solidFill>
+                <a:latin typeface="Aptos" panose="020B0004020202020204" pitchFamily="34" charset="0"/>
+              </a:rPr>
+              <a:t> T. Bui, R. </a:t>
+            </a:r>
+            <a:r>
+              <a:rPr lang="en-US" sz="1600" dirty="0" err="1">
+                <a:solidFill>
+                  <a:schemeClr val="tx1"/>
+                </a:solidFill>
+                <a:latin typeface="Aptos" panose="020B0004020202020204" pitchFamily="34" charset="0"/>
+              </a:rPr>
+              <a:t>Zackula</a:t>
+            </a:r>
+            <a:r>
+              <a:rPr lang="en-US" sz="1600" dirty="0">
+                <a:solidFill>
+                  <a:schemeClr val="tx1"/>
+                </a:solidFill>
+                <a:latin typeface="Aptos" panose="020B0004020202020204" pitchFamily="34" charset="0"/>
+              </a:rPr>
+              <a:t>, K. Dugan, and E. Ablah, “Workplace Stress and Productivity: A Cross-Sectional Study,” Kansas Journal of Medicine, vol. 14, no. 1, Feb. 2021, </a:t>
+            </a:r>
+            <a:r>
+              <a:rPr lang="en-US" sz="1600" dirty="0" err="1">
+                <a:solidFill>
+                  <a:schemeClr val="tx1"/>
+                </a:solidFill>
+                <a:latin typeface="Aptos" panose="020B0004020202020204" pitchFamily="34" charset="0"/>
+              </a:rPr>
+              <a:t>doi</a:t>
+            </a:r>
+            <a:r>
+              <a:rPr lang="en-US" sz="1600" dirty="0">
+                <a:solidFill>
+                  <a:schemeClr val="tx1"/>
+                </a:solidFill>
+                <a:latin typeface="Aptos" panose="020B0004020202020204" pitchFamily="34" charset="0"/>
+              </a:rPr>
+              <a:t>: https://doi.org/10.17161/kjm.vol1413424. Available: https://pmc.ncbi.nlm.nih.gov/articles/PMC7889069/. [Accessed: May 18, 2025]</a:t>
+            </a:r>
+            <a:r>
+              <a:rPr lang="nl-BE" sz="1600" dirty="0">
+                <a:solidFill>
+                  <a:schemeClr val="tx1"/>
+                </a:solidFill>
+                <a:latin typeface="Aptos" panose="020B0004020202020204" pitchFamily="34" charset="0"/>
+              </a:rPr>
+              <a:t>  </a:t>
+            </a:r>
+          </a:p>
+        </p:txBody>
+      </p:sp>
+      <p:pic>
+        <p:nvPicPr>
+          <p:cNvPr id="6" name="Afbeelding 5" descr="Afbeelding met Modeaccessoire, muur, overdekt, kunst&#10;&#10;Door AI gegenereerde inhoud is mogelijk onjuist.">
+            <a:extLst>
+              <a:ext uri="{FF2B5EF4-FFF2-40B4-BE49-F238E27FC236}">
+                <a16:creationId xmlns:a16="http://schemas.microsoft.com/office/drawing/2014/main" id="{61303298-554F-1B3E-FEDF-F1F6E8827B57}"/>
+              </a:ext>
+            </a:extLst>
+          </p:cNvPr>
+          <p:cNvPicPr>
+            <a:picLocks noChangeAspect="1"/>
+          </p:cNvPicPr>
+          <p:nvPr/>
+        </p:nvPicPr>
+        <p:blipFill>
+          <a:blip r:embed="rId6"/>
+          <a:stretch>
+            <a:fillRect/>
+          </a:stretch>
+        </p:blipFill>
+        <p:spPr>
+          <a:xfrm rot="16200000">
+            <a:off x="16420477" y="9329614"/>
+            <a:ext cx="2597154" cy="4528155"/>
+          </a:xfrm>
+          <a:prstGeom prst="rect">
+            <a:avLst/>
+          </a:prstGeom>
+        </p:spPr>
+      </p:pic>
+      <p:sp>
+        <p:nvSpPr>
+          <p:cNvPr id="8" name="Tekstvak 7">
+            <a:extLst>
+              <a:ext uri="{FF2B5EF4-FFF2-40B4-BE49-F238E27FC236}">
+                <a16:creationId xmlns:a16="http://schemas.microsoft.com/office/drawing/2014/main" id="{8C33C790-CBDF-627C-83DE-9350386C7DBB}"/>
+              </a:ext>
+            </a:extLst>
+          </p:cNvPr>
+          <p:cNvSpPr txBox="1"/>
+          <p:nvPr/>
+        </p:nvSpPr>
+        <p:spPr>
+          <a:xfrm>
+            <a:off x="865663" y="10242720"/>
+            <a:ext cx="14525137" cy="2879763"/>
+          </a:xfrm>
+          <a:prstGeom prst="rect">
+            <a:avLst/>
+          </a:prstGeom>
+        </p:spPr>
+        <p:txBody>
+          <a:bodyPr vert="horz" wrap="square" rtlCol="0">
+            <a:spAutoFit/>
+          </a:bodyPr>
+          <a:lstStyle/>
+          <a:p>
+            <a:pPr marL="0" marR="0" lvl="0" indent="0" algn="l" defTabSz="1476027" rtl="0" eaLnBrk="1" fontAlgn="auto" latinLnBrk="0" hangingPunct="1">
+              <a:lnSpc>
+                <a:spcPct val="115000"/>
+              </a:lnSpc>
+              <a:spcBef>
+                <a:spcPts val="0"/>
+              </a:spcBef>
+              <a:spcAft>
+                <a:spcPts val="800"/>
+              </a:spcAft>
+              <a:buClrTx/>
+              <a:buSzTx/>
+              <a:buFontTx/>
+              <a:buNone/>
+              <a:tabLst/>
+              <a:defRPr/>
+            </a:pPr>
+            <a:r>
+              <a:rPr kumimoji="0" lang="nl-BE" sz="2400" b="1" i="0" u="none" strike="noStrike" kern="100" cap="none" spc="0" normalizeH="0" baseline="0" noProof="0" dirty="0" err="1">
+                <a:ln>
+                  <a:noFill/>
+                </a:ln>
+                <a:solidFill>
+                  <a:sysClr val="windowText" lastClr="000000"/>
+                </a:solidFill>
+                <a:effectLst/>
+                <a:uLnTx/>
+                <a:uFillTx/>
+                <a:latin typeface="Aptos" panose="020B0004020202020204" pitchFamily="34" charset="0"/>
+                <a:ea typeface="Aptos" panose="020B0004020202020204" pitchFamily="34" charset="0"/>
+                <a:cs typeface="Times New Roman" panose="02020603050405020304" pitchFamily="18" charset="0"/>
+              </a:rPr>
+              <a:t>Materials</a:t>
+            </a:r>
+            <a:endParaRPr kumimoji="0" lang="nl-BE" sz="2000" b="0" i="0" u="none" strike="noStrike" kern="100" cap="none" spc="0" normalizeH="0" baseline="0" noProof="0" dirty="0">
+              <a:ln>
+                <a:noFill/>
+              </a:ln>
+              <a:solidFill>
+                <a:sysClr val="windowText" lastClr="000000"/>
+              </a:solidFill>
+              <a:effectLst/>
+              <a:uLnTx/>
+              <a:uFillTx/>
+              <a:latin typeface="Aptos" panose="020B0004020202020204" pitchFamily="34" charset="0"/>
+              <a:ea typeface="Aptos" panose="020B0004020202020204" pitchFamily="34" charset="0"/>
+              <a:cs typeface="Times New Roman" panose="02020603050405020304" pitchFamily="18" charset="0"/>
+            </a:endParaRPr>
+          </a:p>
+          <a:p>
+            <a:pPr marL="0" marR="0" lvl="0" indent="0" algn="l" defTabSz="1476027" rtl="0" eaLnBrk="1" fontAlgn="auto" latinLnBrk="0" hangingPunct="1">
+              <a:lnSpc>
+                <a:spcPct val="115000"/>
+              </a:lnSpc>
+              <a:spcBef>
+                <a:spcPts val="0"/>
+              </a:spcBef>
+              <a:spcAft>
+                <a:spcPts val="1200"/>
+              </a:spcAft>
+              <a:buClrTx/>
+              <a:buSzTx/>
+              <a:buFontTx/>
+              <a:buNone/>
+              <a:tabLst/>
+              <a:defRPr/>
+            </a:pPr>
+            <a:r>
+              <a:rPr kumimoji="0" lang="en-US" sz="2000" b="0" i="0" u="none" strike="noStrike" kern="100" cap="none" spc="0" normalizeH="0" baseline="0" noProof="0" dirty="0">
+                <a:ln>
+                  <a:noFill/>
+                </a:ln>
+                <a:solidFill>
+                  <a:sysClr val="windowText" lastClr="000000"/>
+                </a:solidFill>
+                <a:effectLst/>
+                <a:uLnTx/>
+                <a:uFillTx/>
+                <a:latin typeface="Aptos" panose="020B0004020202020204" pitchFamily="34" charset="0"/>
+                <a:ea typeface="Aptos" panose="020B0004020202020204" pitchFamily="34" charset="0"/>
+                <a:cs typeface="Times New Roman" panose="02020603050405020304" pitchFamily="18" charset="0"/>
+              </a:rPr>
+              <a:t>The portable stress measurement device is powered by the </a:t>
+            </a:r>
+            <a:r>
+              <a:rPr kumimoji="0" lang="en-US" sz="2000" b="1" i="0" u="none" strike="noStrike" kern="100" cap="none" spc="0" normalizeH="0" baseline="0" noProof="0" dirty="0">
+                <a:ln>
+                  <a:noFill/>
+                </a:ln>
+                <a:solidFill>
+                  <a:srgbClr val="0070C0"/>
+                </a:solidFill>
+                <a:effectLst/>
+                <a:uLnTx/>
+                <a:uFillTx/>
+                <a:latin typeface="Aptos" panose="020B0004020202020204" pitchFamily="34" charset="0"/>
+                <a:ea typeface="Aptos" panose="020B0004020202020204" pitchFamily="34" charset="0"/>
+                <a:cs typeface="Times New Roman" panose="02020603050405020304" pitchFamily="18" charset="0"/>
+              </a:rPr>
+              <a:t>Arduino Nano ESP32</a:t>
+            </a:r>
+            <a:r>
+              <a:rPr kumimoji="0" lang="en-US" sz="2000" b="0" i="0" u="none" strike="noStrike" kern="100" cap="none" spc="0" normalizeH="0" baseline="0" noProof="0" dirty="0">
+                <a:ln>
+                  <a:noFill/>
+                </a:ln>
+                <a:solidFill>
+                  <a:sysClr val="windowText" lastClr="000000"/>
+                </a:solidFill>
+                <a:effectLst/>
+                <a:uLnTx/>
+                <a:uFillTx/>
+                <a:latin typeface="Aptos" panose="020B0004020202020204" pitchFamily="34" charset="0"/>
+                <a:ea typeface="Aptos" panose="020B0004020202020204" pitchFamily="34" charset="0"/>
+                <a:cs typeface="Times New Roman" panose="02020603050405020304" pitchFamily="18" charset="0"/>
+              </a:rPr>
+              <a:t>, chosen for its compact size, low power consumption, and built-in Bluetooth, enabling real-time wireless data transmission to a smartphone. It collects data from three main sensors, as shown in figure 1.</a:t>
+            </a:r>
+          </a:p>
+          <a:p>
+            <a:pPr marL="324000" marR="0" lvl="0" indent="-342900" algn="l" defTabSz="1476027" rtl="0" eaLnBrk="1" fontAlgn="auto" latinLnBrk="0" hangingPunct="1">
+              <a:lnSpc>
+                <a:spcPct val="115000"/>
+              </a:lnSpc>
+              <a:spcBef>
+                <a:spcPts val="0"/>
+              </a:spcBef>
+              <a:spcAft>
+                <a:spcPts val="0"/>
+              </a:spcAft>
+              <a:buClrTx/>
+              <a:buSzTx/>
+              <a:buFont typeface="Arial" panose="020B0604020202020204" pitchFamily="34" charset="0"/>
+              <a:buChar char="•"/>
+              <a:tabLst/>
+              <a:defRPr/>
+            </a:pPr>
+            <a:r>
+              <a:rPr kumimoji="0" lang="en-US" sz="2000" b="1" i="0" u="none" strike="noStrike" kern="100" cap="none" spc="0" normalizeH="0" baseline="0" noProof="0" dirty="0">
+                <a:ln>
+                  <a:noFill/>
+                </a:ln>
+                <a:solidFill>
+                  <a:srgbClr val="0070C0"/>
+                </a:solidFill>
+                <a:effectLst/>
+                <a:uLnTx/>
+                <a:uFillTx/>
+                <a:latin typeface="Aptos" panose="020B0004020202020204" pitchFamily="34" charset="0"/>
+                <a:ea typeface="Aptos" panose="020B0004020202020204" pitchFamily="34" charset="0"/>
+                <a:cs typeface="Times New Roman" panose="02020603050405020304" pitchFamily="18" charset="0"/>
+              </a:rPr>
+              <a:t>MAX30102:</a:t>
+            </a:r>
+            <a:r>
+              <a:rPr kumimoji="0" lang="en-US" sz="2000" b="0" i="0" u="none" strike="noStrike" kern="100" cap="none" spc="0" normalizeH="0" baseline="0" noProof="0" dirty="0">
+                <a:ln>
+                  <a:noFill/>
+                </a:ln>
+                <a:solidFill>
+                  <a:sysClr val="windowText" lastClr="000000"/>
+                </a:solidFill>
+                <a:effectLst/>
+                <a:uLnTx/>
+                <a:uFillTx/>
+                <a:latin typeface="Aptos" panose="020B0004020202020204" pitchFamily="34" charset="0"/>
+                <a:ea typeface="Aptos" panose="020B0004020202020204" pitchFamily="34" charset="0"/>
+                <a:cs typeface="Times New Roman" panose="02020603050405020304" pitchFamily="18" charset="0"/>
+              </a:rPr>
+              <a:t> An optical sensor that measures </a:t>
+            </a:r>
+            <a:r>
+              <a:rPr kumimoji="0" lang="en-US" sz="2000" b="1" i="0" u="none" strike="noStrike" kern="100" cap="none" spc="0" normalizeH="0" baseline="0" noProof="0" dirty="0">
+                <a:ln>
+                  <a:noFill/>
+                </a:ln>
+                <a:solidFill>
+                  <a:srgbClr val="0070C0"/>
+                </a:solidFill>
+                <a:effectLst/>
+                <a:uLnTx/>
+                <a:uFillTx/>
+                <a:latin typeface="Aptos" panose="020B0004020202020204" pitchFamily="34" charset="0"/>
+                <a:ea typeface="Aptos" panose="020B0004020202020204" pitchFamily="34" charset="0"/>
+                <a:cs typeface="Times New Roman" panose="02020603050405020304" pitchFamily="18" charset="0"/>
+              </a:rPr>
+              <a:t>heart rate and blood oxygen saturation </a:t>
+            </a:r>
+            <a:r>
+              <a:rPr kumimoji="0" lang="en-US" sz="2000" b="0" i="0" u="none" strike="noStrike" kern="100" cap="none" spc="0" normalizeH="0" baseline="0" noProof="0" dirty="0">
+                <a:ln>
+                  <a:noFill/>
+                </a:ln>
+                <a:solidFill>
+                  <a:sysClr val="windowText" lastClr="000000"/>
+                </a:solidFill>
+                <a:effectLst/>
+                <a:uLnTx/>
+                <a:uFillTx/>
+                <a:latin typeface="Aptos" panose="020B0004020202020204" pitchFamily="34" charset="0"/>
+                <a:ea typeface="Aptos" panose="020B0004020202020204" pitchFamily="34" charset="0"/>
+                <a:cs typeface="Times New Roman" panose="02020603050405020304" pitchFamily="18" charset="0"/>
+              </a:rPr>
+              <a:t>(SpO₂) using red and infrared LEDs.</a:t>
+            </a:r>
+          </a:p>
+          <a:p>
+            <a:pPr marL="324000" marR="0" lvl="0" indent="-342900" algn="l" defTabSz="1476027" rtl="0" eaLnBrk="1" fontAlgn="auto" latinLnBrk="0" hangingPunct="1">
+              <a:lnSpc>
+                <a:spcPct val="115000"/>
+              </a:lnSpc>
+              <a:spcBef>
+                <a:spcPts val="0"/>
+              </a:spcBef>
+              <a:spcAft>
+                <a:spcPts val="0"/>
+              </a:spcAft>
+              <a:buClrTx/>
+              <a:buSzTx/>
+              <a:buFont typeface="Arial" panose="020B0604020202020204" pitchFamily="34" charset="0"/>
+              <a:buChar char="•"/>
+              <a:tabLst/>
+              <a:defRPr/>
+            </a:pPr>
+            <a:r>
+              <a:rPr kumimoji="0" lang="en-US" sz="2000" b="1" i="0" u="none" strike="noStrike" kern="100" cap="none" spc="0" normalizeH="0" baseline="0" noProof="0" dirty="0">
+                <a:ln>
+                  <a:noFill/>
+                </a:ln>
+                <a:solidFill>
+                  <a:srgbClr val="0070C0"/>
+                </a:solidFill>
+                <a:effectLst/>
+                <a:uLnTx/>
+                <a:uFillTx/>
+                <a:latin typeface="Aptos" panose="020B0004020202020204" pitchFamily="34" charset="0"/>
+                <a:ea typeface="Aptos" panose="020B0004020202020204" pitchFamily="34" charset="0"/>
+                <a:cs typeface="Times New Roman" panose="02020603050405020304" pitchFamily="18" charset="0"/>
+              </a:rPr>
+              <a:t>Grove GSR Sensor: </a:t>
+            </a:r>
+            <a:r>
+              <a:rPr kumimoji="0" lang="en-US" sz="2000" b="0" i="0" u="none" strike="noStrike" kern="100" cap="none" spc="0" normalizeH="0" baseline="0" noProof="0" dirty="0">
+                <a:ln>
+                  <a:noFill/>
+                </a:ln>
+                <a:solidFill>
+                  <a:sysClr val="windowText" lastClr="000000"/>
+                </a:solidFill>
+                <a:effectLst/>
+                <a:uLnTx/>
+                <a:uFillTx/>
+                <a:latin typeface="Aptos" panose="020B0004020202020204" pitchFamily="34" charset="0"/>
+                <a:ea typeface="Aptos" panose="020B0004020202020204" pitchFamily="34" charset="0"/>
+                <a:cs typeface="Times New Roman" panose="02020603050405020304" pitchFamily="18" charset="0"/>
+              </a:rPr>
+              <a:t>Measures </a:t>
+            </a:r>
+            <a:r>
+              <a:rPr kumimoji="0" lang="en-US" sz="2000" b="1" i="0" u="none" strike="noStrike" kern="100" cap="none" spc="0" normalizeH="0" baseline="0" noProof="0" dirty="0">
+                <a:ln>
+                  <a:noFill/>
+                </a:ln>
+                <a:solidFill>
+                  <a:srgbClr val="0070C0"/>
+                </a:solidFill>
+                <a:effectLst/>
+                <a:uLnTx/>
+                <a:uFillTx/>
+                <a:latin typeface="Aptos" panose="020B0004020202020204" pitchFamily="34" charset="0"/>
+                <a:ea typeface="Aptos" panose="020B0004020202020204" pitchFamily="34" charset="0"/>
+                <a:cs typeface="Times New Roman" panose="02020603050405020304" pitchFamily="18" charset="0"/>
+              </a:rPr>
+              <a:t>skin conductance</a:t>
+            </a:r>
+            <a:r>
+              <a:rPr kumimoji="0" lang="en-US" sz="2000" b="0" i="0" u="none" strike="noStrike" kern="100" cap="none" spc="0" normalizeH="0" baseline="0" noProof="0" dirty="0">
+                <a:ln>
+                  <a:noFill/>
+                </a:ln>
+                <a:solidFill>
+                  <a:sysClr val="windowText" lastClr="000000"/>
+                </a:solidFill>
+                <a:effectLst/>
+                <a:uLnTx/>
+                <a:uFillTx/>
+                <a:latin typeface="Aptos" panose="020B0004020202020204" pitchFamily="34" charset="0"/>
+                <a:ea typeface="Aptos" panose="020B0004020202020204" pitchFamily="34" charset="0"/>
+                <a:cs typeface="Times New Roman" panose="02020603050405020304" pitchFamily="18" charset="0"/>
+              </a:rPr>
+              <a:t>, an indicator of stress, by detecting changes in sweat gland activity.</a:t>
+            </a:r>
+          </a:p>
+          <a:p>
+            <a:pPr marL="324000" marR="0" lvl="0" indent="-342900" algn="l" defTabSz="1476027" rtl="0" eaLnBrk="1" fontAlgn="auto" latinLnBrk="0" hangingPunct="1">
+              <a:lnSpc>
+                <a:spcPct val="115000"/>
+              </a:lnSpc>
+              <a:spcBef>
+                <a:spcPts val="0"/>
+              </a:spcBef>
+              <a:spcAft>
+                <a:spcPts val="1200"/>
+              </a:spcAft>
+              <a:buClrTx/>
+              <a:buSzTx/>
+              <a:buFont typeface="Arial" panose="020B0604020202020204" pitchFamily="34" charset="0"/>
+              <a:buChar char="•"/>
+              <a:tabLst/>
+              <a:defRPr/>
+            </a:pPr>
+            <a:r>
+              <a:rPr kumimoji="0" lang="en-US" sz="2000" b="1" i="0" u="none" strike="noStrike" kern="100" cap="none" spc="0" normalizeH="0" baseline="0" noProof="0" dirty="0" err="1">
+                <a:ln>
+                  <a:noFill/>
+                </a:ln>
+                <a:solidFill>
+                  <a:srgbClr val="0070C0"/>
+                </a:solidFill>
+                <a:effectLst/>
+                <a:uLnTx/>
+                <a:uFillTx/>
+                <a:latin typeface="Aptos" panose="020B0004020202020204" pitchFamily="34" charset="0"/>
+                <a:ea typeface="Aptos" panose="020B0004020202020204" pitchFamily="34" charset="0"/>
+                <a:cs typeface="Times New Roman" panose="02020603050405020304" pitchFamily="18" charset="0"/>
+              </a:rPr>
+              <a:t>Plux</a:t>
+            </a:r>
+            <a:r>
+              <a:rPr kumimoji="0" lang="en-US" sz="2000" b="1" i="0" u="none" strike="noStrike" kern="100" cap="none" spc="0" normalizeH="0" baseline="0" noProof="0" dirty="0">
+                <a:ln>
+                  <a:noFill/>
+                </a:ln>
+                <a:solidFill>
+                  <a:srgbClr val="0070C0"/>
+                </a:solidFill>
+                <a:effectLst/>
+                <a:uLnTx/>
+                <a:uFillTx/>
+                <a:latin typeface="Aptos" panose="020B0004020202020204" pitchFamily="34" charset="0"/>
+                <a:ea typeface="Aptos" panose="020B0004020202020204" pitchFamily="34" charset="0"/>
+                <a:cs typeface="Times New Roman" panose="02020603050405020304" pitchFamily="18" charset="0"/>
+              </a:rPr>
+              <a:t> PZT Sensor: </a:t>
+            </a:r>
+            <a:r>
+              <a:rPr kumimoji="0" lang="en-US" sz="2000" b="0" i="0" u="none" strike="noStrike" kern="100" cap="none" spc="0" normalizeH="0" baseline="0" noProof="0" dirty="0">
+                <a:ln>
+                  <a:noFill/>
+                </a:ln>
+                <a:solidFill>
+                  <a:sysClr val="windowText" lastClr="000000"/>
+                </a:solidFill>
+                <a:effectLst/>
+                <a:uLnTx/>
+                <a:uFillTx/>
+                <a:latin typeface="Aptos" panose="020B0004020202020204" pitchFamily="34" charset="0"/>
+                <a:ea typeface="Aptos" panose="020B0004020202020204" pitchFamily="34" charset="0"/>
+                <a:cs typeface="Times New Roman" panose="02020603050405020304" pitchFamily="18" charset="0"/>
+              </a:rPr>
+              <a:t>Captures </a:t>
+            </a:r>
+            <a:r>
+              <a:rPr kumimoji="0" lang="en-US" sz="2000" b="1" i="0" u="none" strike="noStrike" kern="100" cap="none" spc="0" normalizeH="0" baseline="0" noProof="0" dirty="0">
+                <a:ln>
+                  <a:noFill/>
+                </a:ln>
+                <a:solidFill>
+                  <a:srgbClr val="0070C0"/>
+                </a:solidFill>
+                <a:effectLst/>
+                <a:uLnTx/>
+                <a:uFillTx/>
+                <a:latin typeface="Aptos" panose="020B0004020202020204" pitchFamily="34" charset="0"/>
+                <a:ea typeface="Aptos" panose="020B0004020202020204" pitchFamily="34" charset="0"/>
+                <a:cs typeface="Times New Roman" panose="02020603050405020304" pitchFamily="18" charset="0"/>
+              </a:rPr>
+              <a:t>respiration rate </a:t>
+            </a:r>
+            <a:r>
+              <a:rPr kumimoji="0" lang="en-US" sz="2000" b="0" i="0" u="none" strike="noStrike" kern="100" cap="none" spc="0" normalizeH="0" baseline="0" noProof="0" dirty="0">
+                <a:ln>
+                  <a:noFill/>
+                </a:ln>
+                <a:solidFill>
+                  <a:sysClr val="windowText" lastClr="000000"/>
+                </a:solidFill>
+                <a:effectLst/>
+                <a:uLnTx/>
+                <a:uFillTx/>
+                <a:latin typeface="Aptos" panose="020B0004020202020204" pitchFamily="34" charset="0"/>
+                <a:ea typeface="Aptos" panose="020B0004020202020204" pitchFamily="34" charset="0"/>
+                <a:cs typeface="Times New Roman" panose="02020603050405020304" pitchFamily="18" charset="0"/>
+              </a:rPr>
+              <a:t>using a piezoelectric belt that detects chest movement.</a:t>
+            </a:r>
+          </a:p>
+        </p:txBody>
+      </p:sp>
+      <p:sp>
+        <p:nvSpPr>
+          <p:cNvPr id="9" name="Tekstvak 8">
+            <a:extLst>
+              <a:ext uri="{FF2B5EF4-FFF2-40B4-BE49-F238E27FC236}">
+                <a16:creationId xmlns:a16="http://schemas.microsoft.com/office/drawing/2014/main" id="{33851CD7-DE5C-E5E7-7B09-33326171C72C}"/>
+              </a:ext>
+            </a:extLst>
+          </p:cNvPr>
+          <p:cNvSpPr txBox="1"/>
+          <p:nvPr/>
+        </p:nvSpPr>
+        <p:spPr>
+          <a:xfrm>
+            <a:off x="821019" y="13098854"/>
+            <a:ext cx="19356400" cy="782778"/>
+          </a:xfrm>
+          <a:prstGeom prst="rect">
+            <a:avLst/>
+          </a:prstGeom>
+        </p:spPr>
+        <p:txBody>
+          <a:bodyPr vert="horz" wrap="square" rtlCol="0">
+            <a:spAutoFit/>
+          </a:bodyPr>
+          <a:lstStyle/>
+          <a:p>
+            <a:pPr marL="0" marR="0" lvl="0" indent="0" algn="l" defTabSz="1476027" rtl="0" eaLnBrk="1" fontAlgn="auto" latinLnBrk="0" hangingPunct="1">
+              <a:lnSpc>
+                <a:spcPct val="115000"/>
+              </a:lnSpc>
+              <a:spcBef>
+                <a:spcPts val="0"/>
+              </a:spcBef>
+              <a:spcAft>
+                <a:spcPts val="800"/>
+              </a:spcAft>
+              <a:buClrTx/>
+              <a:buSzTx/>
+              <a:buFontTx/>
+              <a:buNone/>
+              <a:tabLst/>
+              <a:defRPr/>
+            </a:pPr>
+            <a:r>
+              <a:rPr kumimoji="0" lang="en-US" sz="2000" b="0" i="0" u="none" strike="noStrike" kern="100" cap="none" spc="0" normalizeH="0" baseline="0" noProof="0" dirty="0">
+                <a:ln>
+                  <a:noFill/>
+                </a:ln>
+                <a:solidFill>
+                  <a:sysClr val="windowText" lastClr="000000"/>
+                </a:solidFill>
+                <a:effectLst/>
+                <a:uLnTx/>
+                <a:uFillTx/>
+                <a:latin typeface="Aptos" panose="020B0004020202020204" pitchFamily="34" charset="0"/>
+                <a:ea typeface="Aptos" panose="020B0004020202020204" pitchFamily="34" charset="0"/>
+                <a:cs typeface="Times New Roman" panose="02020603050405020304" pitchFamily="18" charset="0"/>
+              </a:rPr>
+              <a:t>All sensor data is processed by the ESP32 in real-time and transmitted via Bluetooth Low Energy (BLE) using a custom GATT service. The firmware, written in C++, includes commands for starting/stopping individual or combined measurements. Sensor readings are combined into a single BLE message and sent to the smartphone for visualization.</a:t>
+            </a:r>
+          </a:p>
+        </p:txBody>
+      </p:sp>
+      <p:sp>
+        <p:nvSpPr>
+          <p:cNvPr id="10" name="Tekstvak 9">
+            <a:extLst>
+              <a:ext uri="{FF2B5EF4-FFF2-40B4-BE49-F238E27FC236}">
+                <a16:creationId xmlns:a16="http://schemas.microsoft.com/office/drawing/2014/main" id="{EF56219E-C7E9-A4E3-83E9-D1EEB7285C6C}"/>
+              </a:ext>
+            </a:extLst>
+          </p:cNvPr>
+          <p:cNvSpPr txBox="1"/>
+          <p:nvPr/>
+        </p:nvSpPr>
+        <p:spPr>
+          <a:xfrm>
+            <a:off x="15106650" y="12862131"/>
+            <a:ext cx="5340350" cy="307777"/>
+          </a:xfrm>
+          <a:prstGeom prst="rect">
+            <a:avLst/>
+          </a:prstGeom>
+        </p:spPr>
+        <p:txBody>
+          <a:bodyPr vert="horz" wrap="square" rtlCol="0">
+            <a:spAutoFit/>
+          </a:bodyPr>
+          <a:lstStyle/>
+          <a:p>
+            <a:pPr algn="ctr"/>
+            <a:r>
+              <a:rPr lang="nl-BE" sz="1400" dirty="0" err="1">
+                <a:solidFill>
+                  <a:schemeClr val="tx1"/>
+                </a:solidFill>
+              </a:rPr>
+              <a:t>Figure</a:t>
+            </a:r>
+            <a:r>
+              <a:rPr lang="nl-BE" sz="1400" dirty="0">
+                <a:solidFill>
+                  <a:schemeClr val="tx1"/>
+                </a:solidFill>
+              </a:rPr>
+              <a:t> 1: </a:t>
+            </a:r>
+            <a:r>
+              <a:rPr lang="nl-BE" sz="1400" dirty="0" err="1"/>
+              <a:t>From</a:t>
+            </a:r>
+            <a:r>
+              <a:rPr lang="nl-BE" sz="1400" dirty="0"/>
+              <a:t> </a:t>
+            </a:r>
+            <a:r>
+              <a:rPr lang="nl-BE" sz="1400" dirty="0" err="1"/>
+              <a:t>left</a:t>
+            </a:r>
+            <a:r>
+              <a:rPr lang="nl-BE" sz="1400" dirty="0"/>
+              <a:t> </a:t>
+            </a:r>
+            <a:r>
+              <a:rPr lang="nl-BE" sz="1400" dirty="0" err="1"/>
+              <a:t>to</a:t>
+            </a:r>
+            <a:r>
+              <a:rPr lang="nl-BE" sz="1400" dirty="0"/>
+              <a:t> right: GSR sensor, MAX30102 </a:t>
+            </a:r>
+            <a:r>
+              <a:rPr lang="nl-BE" sz="1400" dirty="0" err="1"/>
+              <a:t>and</a:t>
+            </a:r>
+            <a:r>
+              <a:rPr lang="nl-BE" sz="1400" dirty="0"/>
+              <a:t> </a:t>
+            </a:r>
+            <a:r>
+              <a:rPr lang="nl-BE" sz="1400" dirty="0" err="1"/>
+              <a:t>Plux</a:t>
+            </a:r>
+            <a:r>
+              <a:rPr lang="nl-BE" sz="1400" dirty="0"/>
+              <a:t> PZT sensor</a:t>
             </a:r>
             <a:endParaRPr lang="nl-BE" sz="1400" dirty="0">
               <a:solidFill>

</xml_diff>